<commit_message>
The Statue Of Liberty
</commit_message>
<xml_diff>
--- a/Resources/OpenTelemetry-DotnetCore 6.pptx
+++ b/Resources/OpenTelemetry-DotnetCore 6.pptx
@@ -8,13 +8,13 @@
     <p:sldId id="256" r:id="rId2"/>
     <p:sldId id="257" r:id="rId3"/>
     <p:sldId id="258" r:id="rId4"/>
-    <p:sldId id="259" r:id="rId5"/>
-    <p:sldId id="260" r:id="rId6"/>
-    <p:sldId id="261" r:id="rId7"/>
-    <p:sldId id="262" r:id="rId8"/>
-    <p:sldId id="263" r:id="rId9"/>
-    <p:sldId id="264" r:id="rId10"/>
-    <p:sldId id="265" r:id="rId11"/>
+    <p:sldId id="260" r:id="rId5"/>
+    <p:sldId id="261" r:id="rId6"/>
+    <p:sldId id="262" r:id="rId7"/>
+    <p:sldId id="263" r:id="rId8"/>
+    <p:sldId id="264" r:id="rId9"/>
+    <p:sldId id="271" r:id="rId10"/>
+    <p:sldId id="272" r:id="rId11"/>
     <p:sldId id="269" r:id="rId12"/>
     <p:sldId id="270" r:id="rId13"/>
     <p:sldId id="266" r:id="rId14"/>
@@ -9742,7 +9742,7 @@
           <a:p>
             <a:fld id="{846CE7D5-CF57-46EF-B807-FDD0502418D4}" type="datetimeFigureOut">
               <a:rPr lang="en-US" smtClean="0"/>
-              <a:t>10/7/2022</a:t>
+              <a:t>11/2/2022</a:t>
             </a:fld>
             <a:endParaRPr lang="en-US"/>
           </a:p>
@@ -9910,7 +9910,7 @@
           <a:p>
             <a:fld id="{846CE7D5-CF57-46EF-B807-FDD0502418D4}" type="datetimeFigureOut">
               <a:rPr lang="en-US" smtClean="0"/>
-              <a:t>10/7/2022</a:t>
+              <a:t>11/2/2022</a:t>
             </a:fld>
             <a:endParaRPr lang="en-US"/>
           </a:p>
@@ -10088,7 +10088,7 @@
           <a:p>
             <a:fld id="{846CE7D5-CF57-46EF-B807-FDD0502418D4}" type="datetimeFigureOut">
               <a:rPr lang="en-US" smtClean="0"/>
-              <a:t>10/7/2022</a:t>
+              <a:t>11/2/2022</a:t>
             </a:fld>
             <a:endParaRPr lang="en-US"/>
           </a:p>
@@ -10256,7 +10256,7 @@
           <a:p>
             <a:fld id="{846CE7D5-CF57-46EF-B807-FDD0502418D4}" type="datetimeFigureOut">
               <a:rPr lang="en-US" smtClean="0"/>
-              <a:t>10/7/2022</a:t>
+              <a:t>11/2/2022</a:t>
             </a:fld>
             <a:endParaRPr lang="en-US"/>
           </a:p>
@@ -10501,7 +10501,7 @@
           <a:p>
             <a:fld id="{846CE7D5-CF57-46EF-B807-FDD0502418D4}" type="datetimeFigureOut">
               <a:rPr lang="en-US" smtClean="0"/>
-              <a:t>10/7/2022</a:t>
+              <a:t>11/2/2022</a:t>
             </a:fld>
             <a:endParaRPr lang="en-US"/>
           </a:p>
@@ -10730,7 +10730,7 @@
           <a:p>
             <a:fld id="{846CE7D5-CF57-46EF-B807-FDD0502418D4}" type="datetimeFigureOut">
               <a:rPr lang="en-US" smtClean="0"/>
-              <a:t>10/7/2022</a:t>
+              <a:t>11/2/2022</a:t>
             </a:fld>
             <a:endParaRPr lang="en-US"/>
           </a:p>
@@ -11094,7 +11094,7 @@
           <a:p>
             <a:fld id="{846CE7D5-CF57-46EF-B807-FDD0502418D4}" type="datetimeFigureOut">
               <a:rPr lang="en-US" smtClean="0"/>
-              <a:t>10/7/2022</a:t>
+              <a:t>11/2/2022</a:t>
             </a:fld>
             <a:endParaRPr lang="en-US"/>
           </a:p>
@@ -11211,7 +11211,7 @@
           <a:p>
             <a:fld id="{846CE7D5-CF57-46EF-B807-FDD0502418D4}" type="datetimeFigureOut">
               <a:rPr lang="en-US" smtClean="0"/>
-              <a:t>10/7/2022</a:t>
+              <a:t>11/2/2022</a:t>
             </a:fld>
             <a:endParaRPr lang="en-US"/>
           </a:p>
@@ -11306,7 +11306,7 @@
           <a:p>
             <a:fld id="{846CE7D5-CF57-46EF-B807-FDD0502418D4}" type="datetimeFigureOut">
               <a:rPr lang="en-US" smtClean="0"/>
-              <a:t>10/7/2022</a:t>
+              <a:t>11/2/2022</a:t>
             </a:fld>
             <a:endParaRPr lang="en-US"/>
           </a:p>
@@ -11581,7 +11581,7 @@
           <a:p>
             <a:fld id="{846CE7D5-CF57-46EF-B807-FDD0502418D4}" type="datetimeFigureOut">
               <a:rPr lang="en-US" smtClean="0"/>
-              <a:t>10/7/2022</a:t>
+              <a:t>11/2/2022</a:t>
             </a:fld>
             <a:endParaRPr lang="en-US"/>
           </a:p>
@@ -11836,7 +11836,7 @@
           <a:p>
             <a:fld id="{846CE7D5-CF57-46EF-B807-FDD0502418D4}" type="datetimeFigureOut">
               <a:rPr lang="en-US" smtClean="0"/>
-              <a:t>10/7/2022</a:t>
+              <a:t>11/2/2022</a:t>
             </a:fld>
             <a:endParaRPr lang="en-US"/>
           </a:p>
@@ -12047,7 +12047,7 @@
           <a:p>
             <a:fld id="{846CE7D5-CF57-46EF-B807-FDD0502418D4}" type="datetimeFigureOut">
               <a:rPr lang="en-US" smtClean="0"/>
-              <a:t>10/7/2022</a:t>
+              <a:t>11/2/2022</a:t>
             </a:fld>
             <a:endParaRPr lang="en-US"/>
           </a:p>
@@ -12972,12 +12972,56 @@
           <a:chExt cx="0" cy="0"/>
         </a:xfrm>
       </p:grpSpPr>
-      <p:sp useBgFill="1">
+      <p:sp>
         <p:nvSpPr>
-          <p:cNvPr id="28" name="Rectangle 22">
+          <p:cNvPr id="2" name="Title 1">
             <a:extLst>
               <a:ext uri="{FF2B5EF4-FFF2-40B4-BE49-F238E27FC236}">
-                <a16:creationId xmlns:a16="http://schemas.microsoft.com/office/drawing/2014/main" id="{1F40F483-2008-4A79-B173-4A9DA0AC3E4E}"/>
+                <a16:creationId xmlns:a16="http://schemas.microsoft.com/office/drawing/2014/main" id="{B3CD776B-4301-4F24-8CF7-DE740DFFDF83}"/>
+              </a:ext>
+            </a:extLst>
+          </p:cNvPr>
+          <p:cNvSpPr>
+            <a:spLocks noGrp="1"/>
+          </p:cNvSpPr>
+          <p:nvPr>
+            <p:ph type="title"/>
+          </p:nvPr>
+        </p:nvSpPr>
+        <p:spPr>
+          <a:xfrm>
+            <a:off x="528637" y="148215"/>
+            <a:ext cx="10825161" cy="932688"/>
+          </a:xfrm>
+        </p:spPr>
+        <p:txBody>
+          <a:bodyPr vert="horz" lIns="91440" tIns="45720" rIns="91440" bIns="45720" rtlCol="0" anchor="b">
+            <a:normAutofit/>
+          </a:bodyPr>
+          <a:lstStyle/>
+          <a:p>
+            <a:r>
+              <a:rPr lang="en-US" sz="5400" kern="1200" dirty="0">
+                <a:solidFill>
+                  <a:schemeClr val="bg1">
+                    <a:lumMod val="50000"/>
+                  </a:schemeClr>
+                </a:solidFill>
+                <a:latin typeface="+mj-lt"/>
+                <a:ea typeface="+mj-ea"/>
+                <a:cs typeface="+mj-cs"/>
+              </a:rPr>
+              <a:t>Code View: Adding our own Logs </a:t>
+            </a:r>
+          </a:p>
+        </p:txBody>
+      </p:sp>
+      <p:sp>
+        <p:nvSpPr>
+          <p:cNvPr id="10" name="Rectangle 9">
+            <a:extLst>
+              <a:ext uri="{FF2B5EF4-FFF2-40B4-BE49-F238E27FC236}">
+                <a16:creationId xmlns:a16="http://schemas.microsoft.com/office/drawing/2014/main" id="{0465601C-04B5-4AE0-8300-C95A72ECD27F}"/>
               </a:ext>
               <a:ext uri="{C183D7F6-B498-43B3-948B-1728B52AA6E4}">
                 <adec:decorative xmlns:adec="http://schemas.microsoft.com/office/drawing/2017/decorative" val="1"/>
@@ -12998,386 +13042,65 @@
         <p:spPr>
           <a:xfrm>
             <a:off x="0" y="0"/>
-            <a:ext cx="12188952" cy="6858000"/>
+            <a:ext cx="126124" cy="6858000"/>
           </a:xfrm>
           <a:prstGeom prst="rect">
             <a:avLst/>
           </a:prstGeom>
-          <a:ln>
+          <a:solidFill>
+            <a:srgbClr val="4472C4"/>
+          </a:solidFill>
+          <a:ln w="12700" cap="flat" cmpd="sng" algn="ctr">
             <a:noFill/>
+            <a:prstDash val="solid"/>
+            <a:miter lim="800000"/>
           </a:ln>
+          <a:effectLst/>
         </p:spPr>
-        <p:style>
-          <a:lnRef idx="2">
-            <a:schemeClr val="accent1">
-              <a:shade val="50000"/>
-            </a:schemeClr>
-          </a:lnRef>
-          <a:fillRef idx="1">
-            <a:schemeClr val="accent1"/>
-          </a:fillRef>
-          <a:effectRef idx="0">
-            <a:schemeClr val="accent1"/>
-          </a:effectRef>
-          <a:fontRef idx="minor">
-            <a:schemeClr val="lt1"/>
-          </a:fontRef>
-        </p:style>
         <p:txBody>
           <a:bodyPr rtlCol="0" anchor="ctr"/>
           <a:lstStyle/>
           <a:p>
-            <a:pPr algn="ctr"/>
-            <a:endParaRPr lang="en-US"/>
-          </a:p>
-        </p:txBody>
-      </p:sp>
-      <p:sp>
-        <p:nvSpPr>
-          <p:cNvPr id="30" name="Freeform: Shape 24">
-            <a:extLst>
-              <a:ext uri="{FF2B5EF4-FFF2-40B4-BE49-F238E27FC236}">
-                <a16:creationId xmlns:a16="http://schemas.microsoft.com/office/drawing/2014/main" id="{D0446FEB-8296-4C58-A416-FE66BF9333A2}"/>
-              </a:ext>
-              <a:ext uri="{C183D7F6-B498-43B3-948B-1728B52AA6E4}">
-                <adec:decorative xmlns:adec="http://schemas.microsoft.com/office/drawing/2017/decorative" val="1"/>
-              </a:ext>
-            </a:extLst>
-          </p:cNvPr>
-          <p:cNvSpPr>
-            <a:spLocks noGrp="1" noRot="1" noChangeAspect="1" noMove="1" noResize="1" noEditPoints="1" noAdjustHandles="1" noChangeArrowheads="1" noChangeShapeType="1" noTextEdit="1"/>
-          </p:cNvSpPr>
-          <p:nvPr>
-            <p:extLst>
-              <p:ext uri="{386F3935-93C4-4BCD-93E2-E3B085C9AB24}">
-                <p16:designElem xmlns:p16="http://schemas.microsoft.com/office/powerpoint/2015/main" val="1"/>
-              </p:ext>
-            </p:extLst>
-          </p:nvPr>
-        </p:nvSpPr>
-        <p:spPr>
-          <a:xfrm>
-            <a:off x="4142164" y="-1"/>
-            <a:ext cx="759618" cy="6858000"/>
-          </a:xfrm>
-          <a:custGeom>
-            <a:avLst/>
-            <a:gdLst>
-              <a:gd name="connsiteX0" fmla="*/ 666 w 759618"/>
-              <a:gd name="connsiteY0" fmla="*/ 0 h 6858000"/>
-              <a:gd name="connsiteX1" fmla="*/ 759618 w 759618"/>
-              <a:gd name="connsiteY1" fmla="*/ 0 h 6858000"/>
-              <a:gd name="connsiteX2" fmla="*/ 759618 w 759618"/>
-              <a:gd name="connsiteY2" fmla="*/ 1613808 h 6858000"/>
-              <a:gd name="connsiteX3" fmla="*/ 759618 w 759618"/>
-              <a:gd name="connsiteY3" fmla="*/ 2003729 h 6858000"/>
-              <a:gd name="connsiteX4" fmla="*/ 759618 w 759618"/>
-              <a:gd name="connsiteY4" fmla="*/ 6858000 h 6858000"/>
-              <a:gd name="connsiteX5" fmla="*/ 0 w 759618"/>
-              <a:gd name="connsiteY5" fmla="*/ 6391227 h 6858000"/>
-              <a:gd name="connsiteX6" fmla="*/ 0 w 759618"/>
-              <a:gd name="connsiteY6" fmla="*/ 1147035 h 6858000"/>
-              <a:gd name="connsiteX7" fmla="*/ 666 w 759618"/>
-              <a:gd name="connsiteY7" fmla="*/ 1147444 h 6858000"/>
-            </a:gdLst>
-            <a:ahLst/>
-            <a:cxnLst>
-              <a:cxn ang="0">
-                <a:pos x="connsiteX0" y="connsiteY0"/>
-              </a:cxn>
-              <a:cxn ang="0">
-                <a:pos x="connsiteX1" y="connsiteY1"/>
-              </a:cxn>
-              <a:cxn ang="0">
-                <a:pos x="connsiteX2" y="connsiteY2"/>
-              </a:cxn>
-              <a:cxn ang="0">
-                <a:pos x="connsiteX3" y="connsiteY3"/>
-              </a:cxn>
-              <a:cxn ang="0">
-                <a:pos x="connsiteX4" y="connsiteY4"/>
-              </a:cxn>
-              <a:cxn ang="0">
-                <a:pos x="connsiteX5" y="connsiteY5"/>
-              </a:cxn>
-              <a:cxn ang="0">
-                <a:pos x="connsiteX6" y="connsiteY6"/>
-              </a:cxn>
-              <a:cxn ang="0">
-                <a:pos x="connsiteX7" y="connsiteY7"/>
-              </a:cxn>
-            </a:cxnLst>
-            <a:rect l="l" t="t" r="r" b="b"/>
-            <a:pathLst>
-              <a:path w="759618" h="6858000">
-                <a:moveTo>
-                  <a:pt x="666" y="0"/>
-                </a:moveTo>
-                <a:lnTo>
-                  <a:pt x="759618" y="0"/>
-                </a:lnTo>
-                <a:lnTo>
-                  <a:pt x="759618" y="1613808"/>
-                </a:lnTo>
-                <a:lnTo>
-                  <a:pt x="759618" y="2003729"/>
-                </a:lnTo>
-                <a:lnTo>
-                  <a:pt x="759618" y="6858000"/>
-                </a:lnTo>
-                <a:lnTo>
-                  <a:pt x="0" y="6391227"/>
-                </a:lnTo>
-                <a:lnTo>
-                  <a:pt x="0" y="1147035"/>
-                </a:lnTo>
-                <a:lnTo>
-                  <a:pt x="666" y="1147444"/>
-                </a:lnTo>
-                <a:close/>
-              </a:path>
-            </a:pathLst>
-          </a:custGeom>
-          <a:solidFill>
-            <a:schemeClr val="accent1">
-              <a:lumMod val="75000"/>
-            </a:schemeClr>
-          </a:solidFill>
-          <a:ln>
-            <a:noFill/>
-          </a:ln>
-        </p:spPr>
-        <p:txBody>
-          <a:bodyPr vert="horz" wrap="square" lIns="91440" tIns="45720" rIns="91440" bIns="45720" numCol="1" anchor="t" anchorCtr="0" compatLnSpc="1">
-            <a:prstTxWarp prst="textNoShape">
-              <a:avLst/>
-            </a:prstTxWarp>
-            <a:noAutofit/>
-          </a:bodyPr>
-          <a:lstStyle/>
-          <a:p>
-            <a:endParaRPr lang="en-US">
+            <a:pPr marL="0" marR="0" lvl="0" indent="0" algn="ctr" defTabSz="914400" eaLnBrk="1" fontAlgn="auto" latinLnBrk="0" hangingPunct="1">
+              <a:lnSpc>
+                <a:spcPct val="100000"/>
+              </a:lnSpc>
+              <a:spcBef>
+                <a:spcPts val="0"/>
+              </a:spcBef>
+              <a:spcAft>
+                <a:spcPts val="0"/>
+              </a:spcAft>
+              <a:buClrTx/>
+              <a:buSzTx/>
+              <a:buFontTx/>
+              <a:buNone/>
+              <a:tabLst/>
+              <a:defRPr/>
+            </a:pPr>
+            <a:endParaRPr kumimoji="0" lang="en-US" sz="1800" b="0" i="0" u="none" strike="noStrike" kern="0" cap="none" spc="0" normalizeH="0" baseline="0" noProof="0">
+              <a:ln>
+                <a:noFill/>
+              </a:ln>
               <a:solidFill>
-                <a:schemeClr val="tx1"/>
+                <a:prstClr val="white"/>
               </a:solidFill>
+              <a:effectLst/>
+              <a:uLnTx/>
+              <a:uFillTx/>
+              <a:latin typeface="Calibri" panose="020F0502020204030204"/>
+              <a:ea typeface="+mn-ea"/>
+              <a:cs typeface="+mn-cs"/>
             </a:endParaRPr>
-          </a:p>
-        </p:txBody>
-      </p:sp>
-      <p:sp>
-        <p:nvSpPr>
-          <p:cNvPr id="27" name="Freeform 7">
-            <a:extLst>
-              <a:ext uri="{FF2B5EF4-FFF2-40B4-BE49-F238E27FC236}">
-                <a16:creationId xmlns:a16="http://schemas.microsoft.com/office/drawing/2014/main" id="{B14F32D1-131A-4E26-9F16-AF1A8F488DC0}"/>
-              </a:ext>
-              <a:ext uri="{C183D7F6-B498-43B3-948B-1728B52AA6E4}">
-                <adec:decorative xmlns:adec="http://schemas.microsoft.com/office/drawing/2017/decorative" val="1"/>
-              </a:ext>
-            </a:extLst>
-          </p:cNvPr>
-          <p:cNvSpPr>
-            <a:spLocks noGrp="1" noRot="1" noChangeAspect="1" noMove="1" noResize="1" noEditPoints="1" noAdjustHandles="1" noChangeArrowheads="1" noChangeShapeType="1" noTextEdit="1"/>
-          </p:cNvSpPr>
-          <p:nvPr>
-            <p:extLst>
-              <p:ext uri="{386F3935-93C4-4BCD-93E2-E3B085C9AB24}">
-                <p16:designElem xmlns:p16="http://schemas.microsoft.com/office/powerpoint/2015/main" val="1"/>
-              </p:ext>
-            </p:extLst>
-          </p:nvPr>
-        </p:nvSpPr>
-        <p:spPr bwMode="auto">
-          <a:xfrm>
-            <a:off x="4144437" y="879652"/>
-            <a:ext cx="482654" cy="5521414"/>
-          </a:xfrm>
-          <a:custGeom>
-            <a:avLst/>
-            <a:gdLst>
-              <a:gd name="T0" fmla="*/ 209 w 209"/>
-              <a:gd name="T1" fmla="*/ 2246 h 2358"/>
-              <a:gd name="T2" fmla="*/ 0 w 209"/>
-              <a:gd name="T3" fmla="*/ 2358 h 2358"/>
-              <a:gd name="T4" fmla="*/ 0 w 209"/>
-              <a:gd name="T5" fmla="*/ 111 h 2358"/>
-              <a:gd name="T6" fmla="*/ 209 w 209"/>
-              <a:gd name="T7" fmla="*/ 0 h 2358"/>
-              <a:gd name="T8" fmla="*/ 209 w 209"/>
-              <a:gd name="T9" fmla="*/ 2246 h 2358"/>
-            </a:gdLst>
-            <a:ahLst/>
-            <a:cxnLst>
-              <a:cxn ang="0">
-                <a:pos x="T0" y="T1"/>
-              </a:cxn>
-              <a:cxn ang="0">
-                <a:pos x="T2" y="T3"/>
-              </a:cxn>
-              <a:cxn ang="0">
-                <a:pos x="T4" y="T5"/>
-              </a:cxn>
-              <a:cxn ang="0">
-                <a:pos x="T6" y="T7"/>
-              </a:cxn>
-              <a:cxn ang="0">
-                <a:pos x="T8" y="T9"/>
-              </a:cxn>
-            </a:cxnLst>
-            <a:rect l="0" t="0" r="r" b="b"/>
-            <a:pathLst>
-              <a:path w="209" h="2358">
-                <a:moveTo>
-                  <a:pt x="209" y="2246"/>
-                </a:moveTo>
-                <a:lnTo>
-                  <a:pt x="0" y="2358"/>
-                </a:lnTo>
-                <a:lnTo>
-                  <a:pt x="0" y="111"/>
-                </a:lnTo>
-                <a:lnTo>
-                  <a:pt x="209" y="0"/>
-                </a:lnTo>
-                <a:lnTo>
-                  <a:pt x="209" y="2246"/>
-                </a:lnTo>
-                <a:close/>
-              </a:path>
-            </a:pathLst>
-          </a:custGeom>
-          <a:solidFill>
-            <a:schemeClr val="accent1">
-              <a:lumMod val="50000"/>
-            </a:schemeClr>
-          </a:solidFill>
-          <a:ln>
-            <a:noFill/>
-          </a:ln>
-        </p:spPr>
-        <p:txBody>
-          <a:bodyPr vert="horz" wrap="square" lIns="91440" tIns="45720" rIns="91440" bIns="45720" numCol="1" anchor="t" anchorCtr="0" compatLnSpc="1">
-            <a:prstTxWarp prst="textNoShape">
-              <a:avLst/>
-            </a:prstTxWarp>
-          </a:bodyPr>
-          <a:lstStyle/>
-          <a:p>
-            <a:endParaRPr lang="en-US"/>
-          </a:p>
-        </p:txBody>
-      </p:sp>
-      <p:sp useBgFill="1">
-        <p:nvSpPr>
-          <p:cNvPr id="29" name="Freeform: Shape 28">
-            <a:extLst>
-              <a:ext uri="{FF2B5EF4-FFF2-40B4-BE49-F238E27FC236}">
-                <a16:creationId xmlns:a16="http://schemas.microsoft.com/office/drawing/2014/main" id="{1ABC2BC2-F576-4967-9EDA-93DBDDD8D1C4}"/>
-              </a:ext>
-              <a:ext uri="{C183D7F6-B498-43B3-948B-1728B52AA6E4}">
-                <adec:decorative xmlns:adec="http://schemas.microsoft.com/office/drawing/2017/decorative" val="1"/>
-              </a:ext>
-            </a:extLst>
-          </p:cNvPr>
-          <p:cNvSpPr>
-            <a:spLocks noGrp="1" noRot="1" noChangeAspect="1" noMove="1" noResize="1" noEditPoints="1" noAdjustHandles="1" noChangeArrowheads="1" noChangeShapeType="1" noTextEdit="1"/>
-          </p:cNvSpPr>
-          <p:nvPr>
-            <p:extLst>
-              <p:ext uri="{386F3935-93C4-4BCD-93E2-E3B085C9AB24}">
-                <p16:designElem xmlns:p16="http://schemas.microsoft.com/office/powerpoint/2015/main" val="1"/>
-              </p:ext>
-            </p:extLst>
-          </p:nvPr>
-        </p:nvSpPr>
-        <p:spPr>
-          <a:xfrm>
-            <a:off x="1" y="1"/>
-            <a:ext cx="4634682" cy="6141008"/>
-          </a:xfrm>
-          <a:custGeom>
-            <a:avLst/>
-            <a:gdLst>
-              <a:gd name="connsiteX0" fmla="*/ 0 w 4634682"/>
-              <a:gd name="connsiteY0" fmla="*/ 0 h 6141008"/>
-              <a:gd name="connsiteX1" fmla="*/ 4634682 w 4634682"/>
-              <a:gd name="connsiteY1" fmla="*/ 0 h 6141008"/>
-              <a:gd name="connsiteX2" fmla="*/ 4634682 w 4634682"/>
-              <a:gd name="connsiteY2" fmla="*/ 6141008 h 6141008"/>
-              <a:gd name="connsiteX3" fmla="*/ 0 w 4634682"/>
-              <a:gd name="connsiteY3" fmla="*/ 6141008 h 6141008"/>
-            </a:gdLst>
-            <a:ahLst/>
-            <a:cxnLst>
-              <a:cxn ang="0">
-                <a:pos x="connsiteX0" y="connsiteY0"/>
-              </a:cxn>
-              <a:cxn ang="0">
-                <a:pos x="connsiteX1" y="connsiteY1"/>
-              </a:cxn>
-              <a:cxn ang="0">
-                <a:pos x="connsiteX2" y="connsiteY2"/>
-              </a:cxn>
-              <a:cxn ang="0">
-                <a:pos x="connsiteX3" y="connsiteY3"/>
-              </a:cxn>
-            </a:cxnLst>
-            <a:rect l="l" t="t" r="r" b="b"/>
-            <a:pathLst>
-              <a:path w="4634682" h="6141008">
-                <a:moveTo>
-                  <a:pt x="0" y="0"/>
-                </a:moveTo>
-                <a:lnTo>
-                  <a:pt x="4634682" y="0"/>
-                </a:lnTo>
-                <a:lnTo>
-                  <a:pt x="4634682" y="6141008"/>
-                </a:lnTo>
-                <a:lnTo>
-                  <a:pt x="0" y="6141008"/>
-                </a:lnTo>
-                <a:close/>
-              </a:path>
-            </a:pathLst>
-          </a:custGeom>
-          <a:ln w="9525">
-            <a:noFill/>
-          </a:ln>
-        </p:spPr>
-        <p:style>
-          <a:lnRef idx="2">
-            <a:schemeClr val="accent1">
-              <a:shade val="50000"/>
-            </a:schemeClr>
-          </a:lnRef>
-          <a:fillRef idx="1">
-            <a:schemeClr val="accent1"/>
-          </a:fillRef>
-          <a:effectRef idx="0">
-            <a:schemeClr val="accent1"/>
-          </a:effectRef>
-          <a:fontRef idx="minor">
-            <a:schemeClr val="lt1"/>
-          </a:fontRef>
-        </p:style>
-        <p:txBody>
-          <a:bodyPr wrap="square" rtlCol="0" anchor="ctr">
-            <a:noAutofit/>
-          </a:bodyPr>
-          <a:lstStyle/>
-          <a:p>
-            <a:pPr algn="ctr"/>
-            <a:endParaRPr lang="en-US"/>
           </a:p>
         </p:txBody>
       </p:sp>
       <p:pic>
         <p:nvPicPr>
-          <p:cNvPr id="8" name="Picture 8" descr="Text&#10;&#10;Description automatically generated">
+          <p:cNvPr id="5" name="Content Placeholder 4">
             <a:extLst>
               <a:ext uri="{FF2B5EF4-FFF2-40B4-BE49-F238E27FC236}">
-                <a16:creationId xmlns:a16="http://schemas.microsoft.com/office/drawing/2014/main" id="{236F3A59-35B4-526F-3D53-224F5DB55F8A}"/>
+                <a16:creationId xmlns:a16="http://schemas.microsoft.com/office/drawing/2014/main" id="{DD307DAB-E748-4503-80BD-C39F15B76150}"/>
               </a:ext>
             </a:extLst>
           </p:cNvPr>
@@ -13385,7 +13108,7 @@
             <a:picLocks noGrp="1" noChangeAspect="1"/>
           </p:cNvPicPr>
           <p:nvPr>
-            <p:ph sz="half" idx="2"/>
+            <p:ph idx="1"/>
           </p:nvPr>
         </p:nvPicPr>
         <p:blipFill>
@@ -13396,206 +13119,18 @@
         </p:blipFill>
         <p:spPr>
           <a:xfrm>
-            <a:off x="650140" y="2144368"/>
-            <a:ext cx="3816084" cy="2146546"/>
+            <a:off x="1214438" y="1271588"/>
+            <a:ext cx="9558337" cy="5323896"/>
           </a:xfrm>
           <a:prstGeom prst="rect">
             <a:avLst/>
           </a:prstGeom>
         </p:spPr>
       </p:pic>
-      <p:sp>
-        <p:nvSpPr>
-          <p:cNvPr id="31" name="Rectangle 8">
-            <a:extLst>
-              <a:ext uri="{FF2B5EF4-FFF2-40B4-BE49-F238E27FC236}">
-                <a16:creationId xmlns:a16="http://schemas.microsoft.com/office/drawing/2014/main" id="{C1ED7A15-93F4-4241-81AA-1F6EDAE94F88}"/>
-              </a:ext>
-              <a:ext uri="{C183D7F6-B498-43B3-948B-1728B52AA6E4}">
-                <adec:decorative xmlns:adec="http://schemas.microsoft.com/office/drawing/2017/decorative" val="1"/>
-              </a:ext>
-            </a:extLst>
-          </p:cNvPr>
-          <p:cNvSpPr>
-            <a:spLocks noGrp="1" noRot="1" noChangeAspect="1" noMove="1" noResize="1" noEditPoints="1" noAdjustHandles="1" noChangeArrowheads="1" noChangeShapeType="1" noTextEdit="1"/>
-          </p:cNvSpPr>
-          <p:nvPr>
-            <p:extLst>
-              <p:ext uri="{386F3935-93C4-4BCD-93E2-E3B085C9AB24}">
-                <p16:designElem xmlns:p16="http://schemas.microsoft.com/office/powerpoint/2015/main" val="1"/>
-              </p:ext>
-            </p:extLst>
-          </p:nvPr>
-        </p:nvSpPr>
-        <p:spPr bwMode="auto">
-          <a:xfrm>
-            <a:off x="4901782" y="1"/>
-            <a:ext cx="7287170" cy="6857999"/>
-          </a:xfrm>
-          <a:prstGeom prst="rect">
-            <a:avLst/>
-          </a:prstGeom>
-          <a:solidFill>
-            <a:schemeClr val="accent1"/>
-          </a:solidFill>
-          <a:ln>
-            <a:noFill/>
-          </a:ln>
-        </p:spPr>
-        <p:txBody>
-          <a:bodyPr vert="horz" wrap="square" lIns="91440" tIns="45720" rIns="91440" bIns="45720" numCol="1" anchor="t" anchorCtr="0" compatLnSpc="1">
-            <a:prstTxWarp prst="textNoShape">
-              <a:avLst/>
-            </a:prstTxWarp>
-          </a:bodyPr>
-          <a:lstStyle/>
-          <a:p>
-            <a:endParaRPr lang="en-US"/>
-          </a:p>
-        </p:txBody>
-      </p:sp>
-      <p:sp>
-        <p:nvSpPr>
-          <p:cNvPr id="2" name="Title 1">
-            <a:extLst>
-              <a:ext uri="{FF2B5EF4-FFF2-40B4-BE49-F238E27FC236}">
-                <a16:creationId xmlns:a16="http://schemas.microsoft.com/office/drawing/2014/main" id="{D1E9B754-B995-FA38-A9DB-CE57A47BB7E2}"/>
-              </a:ext>
-            </a:extLst>
-          </p:cNvPr>
-          <p:cNvSpPr>
-            <a:spLocks noGrp="1"/>
-          </p:cNvSpPr>
-          <p:nvPr>
-            <p:ph type="title"/>
-          </p:nvPr>
-        </p:nvSpPr>
-        <p:spPr>
-          <a:xfrm>
-            <a:off x="5552841" y="643466"/>
-            <a:ext cx="5840770" cy="1334866"/>
-          </a:xfrm>
-        </p:spPr>
-        <p:txBody>
-          <a:bodyPr vert="horz" lIns="91440" tIns="45720" rIns="91440" bIns="45720" rtlCol="0" anchor="ctr">
-            <a:normAutofit/>
-          </a:bodyPr>
-          <a:lstStyle/>
-          <a:p>
-            <a:r>
-              <a:rPr lang="en-US" sz="4000" kern="1200" dirty="0">
-                <a:solidFill>
-                  <a:srgbClr val="FFFFFF"/>
-                </a:solidFill>
-                <a:latin typeface="+mj-lt"/>
-                <a:ea typeface="+mj-ea"/>
-                <a:cs typeface="+mj-cs"/>
-              </a:rPr>
-              <a:t>The Challenge: Integration with ASP.NET Core 6</a:t>
-            </a:r>
-          </a:p>
-        </p:txBody>
-      </p:sp>
-      <p:sp>
-        <p:nvSpPr>
-          <p:cNvPr id="32" name="Content Placeholder 2">
-            <a:extLst>
-              <a:ext uri="{FF2B5EF4-FFF2-40B4-BE49-F238E27FC236}">
-                <a16:creationId xmlns:a16="http://schemas.microsoft.com/office/drawing/2014/main" id="{505E234D-2189-6563-A31B-BE36879110FD}"/>
-              </a:ext>
-            </a:extLst>
-          </p:cNvPr>
-          <p:cNvSpPr>
-            <a:spLocks noGrp="1"/>
-          </p:cNvSpPr>
-          <p:nvPr>
-            <p:ph sz="half" idx="1"/>
-          </p:nvPr>
-        </p:nvSpPr>
-        <p:spPr>
-          <a:xfrm>
-            <a:off x="5552840" y="2144368"/>
-            <a:ext cx="5840770" cy="4256697"/>
-          </a:xfrm>
-        </p:spPr>
-        <p:txBody>
-          <a:bodyPr vert="horz" lIns="91440" tIns="45720" rIns="91440" bIns="45720" rtlCol="0" anchor="t">
-            <a:normAutofit fontScale="85000" lnSpcReduction="20000"/>
-          </a:bodyPr>
-          <a:lstStyle/>
-          <a:p>
-            <a:pPr>
-              <a:lnSpc>
-                <a:spcPct val="150000"/>
-              </a:lnSpc>
-            </a:pPr>
-            <a:r>
-              <a:rPr lang="en-US" sz="2200" dirty="0">
-                <a:solidFill>
-                  <a:srgbClr val="FEFFFF"/>
-                </a:solidFill>
-              </a:rPr>
-              <a:t>It is always a good practice to use open telemetry in our APIs and in worker services.</a:t>
-            </a:r>
-          </a:p>
-          <a:p>
-            <a:pPr>
-              <a:lnSpc>
-                <a:spcPct val="150000"/>
-              </a:lnSpc>
-            </a:pPr>
-            <a:r>
-              <a:rPr lang="en-US" sz="2200" dirty="0">
-                <a:solidFill>
-                  <a:srgbClr val="FEFFFF"/>
-                </a:solidFill>
-              </a:rPr>
-              <a:t>Using OTel, we can trace the requests made by users to our APIs. We can also trace the resources used by them.</a:t>
-            </a:r>
-            <a:endParaRPr lang="en-US" sz="2200" dirty="0">
-              <a:solidFill>
-                <a:srgbClr val="FEFFFF"/>
-              </a:solidFill>
-              <a:cs typeface="Calibri"/>
-            </a:endParaRPr>
-          </a:p>
-          <a:p>
-            <a:pPr>
-              <a:lnSpc>
-                <a:spcPct val="150000"/>
-              </a:lnSpc>
-            </a:pPr>
-            <a:r>
-              <a:rPr lang="en-US" sz="2200" dirty="0">
-                <a:solidFill>
-                  <a:srgbClr val="FEFFFF"/>
-                </a:solidFill>
-              </a:rPr>
-              <a:t>With simple codes, the developers can trace any malfunctions or errata. They can also trace the way their resources are used.</a:t>
-            </a:r>
-          </a:p>
-          <a:p>
-            <a:pPr>
-              <a:lnSpc>
-                <a:spcPct val="150000"/>
-              </a:lnSpc>
-            </a:pPr>
-            <a:r>
-              <a:rPr lang="en-US" sz="2200" dirty="0">
-                <a:solidFill>
-                  <a:srgbClr val="FEFFFF"/>
-                </a:solidFill>
-                <a:cs typeface="Calibri" panose="020F0502020204030204"/>
-              </a:rPr>
-              <a:t>The challenge was to collect telemetry data and export them to backend or opensource tools.</a:t>
-            </a:r>
-          </a:p>
-        </p:txBody>
-      </p:sp>
     </p:spTree>
     <p:extLst>
       <p:ext uri="{BB962C8B-B14F-4D97-AF65-F5344CB8AC3E}">
-        <p14:creationId xmlns:p14="http://schemas.microsoft.com/office/powerpoint/2010/main" val="1792075392"/>
+        <p14:creationId xmlns:p14="http://schemas.microsoft.com/office/powerpoint/2010/main" val="2981741910"/>
       </p:ext>
     </p:extLst>
   </p:cSld>
@@ -13941,7 +13476,7 @@
             </a:pPr>
             <a:r>
               <a:rPr lang="en-US" sz="2000" dirty="0"/>
-              <a:t>The solution was to run the images of Jaeger, Zipkin, Elasticsearch, Logstash and Kibana as containers in Docker or in Kubernetes (K8s).</a:t>
+              <a:t>First, we need to run the images of Jaeger, Zipkin, Elasticsearch, Logstash and Kibana as containers in Docker or in Kubernetes (K8s).</a:t>
             </a:r>
           </a:p>
           <a:p>
@@ -14056,9 +13591,16 @@
             <p:ph type="title"/>
           </p:nvPr>
         </p:nvSpPr>
-        <p:spPr/>
+        <p:spPr>
+          <a:xfrm>
+            <a:off x="390180" y="92257"/>
+            <a:ext cx="10963620" cy="679268"/>
+          </a:xfrm>
+        </p:spPr>
         <p:txBody>
-          <a:bodyPr/>
+          <a:bodyPr>
+            <a:normAutofit fontScale="90000"/>
+          </a:bodyPr>
           <a:lstStyle/>
           <a:p>
             <a:r>
@@ -14069,7 +13611,7 @@
                   </a:schemeClr>
                 </a:solidFill>
               </a:rPr>
-              <a:t>The Applications</a:t>
+              <a:t>The Applications &amp; OTel Architecture</a:t>
             </a:r>
             <a:endParaRPr lang="en-IN" dirty="0">
               <a:solidFill>
@@ -14105,8 +13647,8 @@
         </p:blipFill>
         <p:spPr>
           <a:xfrm>
-            <a:off x="961680" y="1914524"/>
-            <a:ext cx="4739033" cy="2286001"/>
+            <a:off x="390181" y="1142999"/>
+            <a:ext cx="4496144" cy="2028826"/>
           </a:xfrm>
           <a:effectLst>
             <a:outerShdw blurRad="50800" dist="38100" dir="5400000" algn="t" rotWithShape="0">
@@ -14146,8 +13688,8 @@
         </p:blipFill>
         <p:spPr>
           <a:xfrm>
-            <a:off x="6295683" y="1914524"/>
-            <a:ext cx="5058117" cy="3900489"/>
+            <a:off x="390180" y="3486149"/>
+            <a:ext cx="4496145" cy="3086101"/>
           </a:xfrm>
           <a:effectLst>
             <a:outerShdw blurRad="50800" dist="38100" dir="5400000" algn="t" rotWithShape="0">
@@ -14172,8 +13714,8 @@
         </p:nvSpPr>
         <p:spPr>
           <a:xfrm>
-            <a:off x="6838608" y="2151727"/>
-            <a:ext cx="3611117" cy="2554545"/>
+            <a:off x="552108" y="3592096"/>
+            <a:ext cx="3101042" cy="2185214"/>
           </a:xfrm>
           <a:prstGeom prst="rect">
             <a:avLst/>
@@ -14187,7 +13729,7 @@
           <a:lstStyle/>
           <a:p>
             <a:r>
-              <a:rPr lang="en-US" sz="4000" b="1" cap="none" spc="0" dirty="0">
+              <a:rPr lang="en-US" sz="3400" b="1" cap="none" spc="0" dirty="0">
                 <a:ln w="9525">
                   <a:solidFill>
                     <a:schemeClr val="bg1"/>
@@ -14211,7 +13753,7 @@
           </a:p>
           <a:p>
             <a:r>
-              <a:rPr lang="en-US" sz="4000" b="1" dirty="0">
+              <a:rPr lang="en-US" sz="3400" b="1" dirty="0">
                 <a:ln w="9525">
                   <a:solidFill>
                     <a:schemeClr val="bg1"/>
@@ -14235,7 +13777,7 @@
           </a:p>
           <a:p>
             <a:r>
-              <a:rPr lang="en-US" sz="4000" b="1" cap="none" spc="0" dirty="0">
+              <a:rPr lang="en-US" sz="3400" b="1" cap="none" spc="0" dirty="0">
                 <a:ln w="9525">
                   <a:solidFill>
                     <a:schemeClr val="bg1"/>
@@ -14259,7 +13801,7 @@
           </a:p>
           <a:p>
             <a:r>
-              <a:rPr lang="en-US" sz="4000" b="1" cap="none" spc="0" dirty="0">
+              <a:rPr lang="en-US" sz="3400" b="1" cap="none" spc="0" dirty="0">
                 <a:ln w="9525">
                   <a:solidFill>
                     <a:schemeClr val="bg1"/>
@@ -14285,123 +13827,1517 @@
       </p:sp>
       <p:sp>
         <p:nvSpPr>
-          <p:cNvPr id="12" name="TextBox 11">
+          <p:cNvPr id="3" name="Rectangle 2">
             <a:extLst>
               <a:ext uri="{FF2B5EF4-FFF2-40B4-BE49-F238E27FC236}">
-                <a16:creationId xmlns:a16="http://schemas.microsoft.com/office/drawing/2014/main" id="{7543523B-CD94-4F63-8E85-F5F38807C18E}"/>
+                <a16:creationId xmlns:a16="http://schemas.microsoft.com/office/drawing/2014/main" id="{FC28D3F7-C7D4-42DC-9F16-43155EC21A7E}"/>
               </a:ext>
             </a:extLst>
           </p:cNvPr>
-          <p:cNvSpPr txBox="1"/>
+          <p:cNvSpPr/>
           <p:nvPr/>
         </p:nvSpPr>
         <p:spPr>
           <a:xfrm>
-            <a:off x="961680" y="4706272"/>
-            <a:ext cx="4276725" cy="1891287"/>
+            <a:off x="5200650" y="1142999"/>
+            <a:ext cx="6601169" cy="5429251"/>
           </a:xfrm>
           <a:prstGeom prst="rect">
             <a:avLst/>
           </a:prstGeom>
-          <a:noFill/>
+          <a:ln>
+            <a:noFill/>
+          </a:ln>
+          <a:effectLst>
+            <a:outerShdw blurRad="44450" dist="27940" dir="5400000" algn="ctr">
+              <a:srgbClr val="000000">
+                <a:alpha val="32000"/>
+              </a:srgbClr>
+            </a:outerShdw>
+          </a:effectLst>
+          <a:scene3d>
+            <a:camera prst="orthographicFront">
+              <a:rot lat="0" lon="0" rev="0"/>
+            </a:camera>
+            <a:lightRig rig="balanced" dir="t">
+              <a:rot lat="0" lon="0" rev="8700000"/>
+            </a:lightRig>
+          </a:scene3d>
+          <a:sp3d>
+            <a:bevelT w="190500" h="38100"/>
+          </a:sp3d>
         </p:spPr>
+        <p:style>
+          <a:lnRef idx="2">
+            <a:schemeClr val="accent6"/>
+          </a:lnRef>
+          <a:fillRef idx="1">
+            <a:schemeClr val="lt1"/>
+          </a:fillRef>
+          <a:effectRef idx="0">
+            <a:schemeClr val="accent6"/>
+          </a:effectRef>
+          <a:fontRef idx="minor">
+            <a:schemeClr val="dk1"/>
+          </a:fontRef>
+        </p:style>
         <p:txBody>
-          <a:bodyPr wrap="square" rtlCol="0">
-            <a:spAutoFit/>
-          </a:bodyPr>
+          <a:bodyPr rtlCol="0" anchor="ctr"/>
           <a:lstStyle/>
           <a:p>
-            <a:pPr>
-              <a:lnSpc>
-                <a:spcPct val="150000"/>
-              </a:lnSpc>
-            </a:pPr>
-            <a:r>
-              <a:rPr lang="en-US" sz="2000" dirty="0">
-                <a:solidFill>
-                  <a:schemeClr val="accent1">
-                    <a:lumMod val="50000"/>
-                  </a:schemeClr>
-                </a:solidFill>
-                <a:effectLst>
-                  <a:outerShdw blurRad="38100" dist="38100" dir="2700000" algn="tl">
-                    <a:srgbClr val="000000">
-                      <a:alpha val="43137"/>
-                    </a:srgbClr>
-                  </a:outerShdw>
-                </a:effectLst>
-              </a:rPr>
-              <a:t>The open telemetry was supposed to be implemented in </a:t>
-            </a:r>
-          </a:p>
-          <a:p>
-            <a:pPr marL="285750" indent="-285750">
-              <a:lnSpc>
-                <a:spcPct val="150000"/>
-              </a:lnSpc>
-              <a:buFont typeface="Wingdings" panose="05000000000000000000" pitchFamily="2" charset="2"/>
-              <a:buChar char="ü"/>
-            </a:pPr>
-            <a:r>
-              <a:rPr lang="en-US" sz="2000" dirty="0">
-                <a:solidFill>
-                  <a:schemeClr val="accent1">
-                    <a:lumMod val="50000"/>
-                  </a:schemeClr>
-                </a:solidFill>
-                <a:effectLst>
-                  <a:outerShdw blurRad="38100" dist="38100" dir="2700000" algn="tl">
-                    <a:srgbClr val="000000">
-                      <a:alpha val="43137"/>
-                    </a:srgbClr>
-                  </a:outerShdw>
-                </a:effectLst>
-              </a:rPr>
-              <a:t>ASP.NET Core 6 WebAPI</a:t>
-            </a:r>
-          </a:p>
-          <a:p>
-            <a:pPr marL="285750" indent="-285750">
-              <a:lnSpc>
-                <a:spcPct val="150000"/>
-              </a:lnSpc>
-              <a:buFont typeface="Wingdings" panose="05000000000000000000" pitchFamily="2" charset="2"/>
-              <a:buChar char="ü"/>
-            </a:pPr>
-            <a:r>
-              <a:rPr lang="en-US" sz="2000" dirty="0">
-                <a:solidFill>
-                  <a:schemeClr val="accent1">
-                    <a:lumMod val="50000"/>
-                  </a:schemeClr>
-                </a:solidFill>
-                <a:effectLst>
-                  <a:outerShdw blurRad="38100" dist="38100" dir="2700000" algn="tl">
-                    <a:srgbClr val="000000">
-                      <a:alpha val="43137"/>
-                    </a:srgbClr>
-                  </a:outerShdw>
-                </a:effectLst>
-              </a:rPr>
-              <a:t>ASP.NET Core 6 Worker Services</a:t>
-            </a:r>
-            <a:endParaRPr lang="en-IN" sz="2000" dirty="0">
-              <a:solidFill>
-                <a:schemeClr val="accent1">
-                  <a:lumMod val="50000"/>
-                </a:schemeClr>
-              </a:solidFill>
-              <a:effectLst>
-                <a:outerShdw blurRad="38100" dist="38100" dir="2700000" algn="tl">
-                  <a:srgbClr val="000000">
-                    <a:alpha val="43137"/>
-                  </a:srgbClr>
-                </a:outerShdw>
-              </a:effectLst>
-            </a:endParaRPr>
+            <a:pPr algn="ctr"/>
+            <a:endParaRPr lang="en-IN"/>
           </a:p>
         </p:txBody>
       </p:sp>
+      <p:cxnSp>
+        <p:nvCxnSpPr>
+          <p:cNvPr id="28" name="Straight Connector 27">
+            <a:extLst>
+              <a:ext uri="{FF2B5EF4-FFF2-40B4-BE49-F238E27FC236}">
+                <a16:creationId xmlns:a16="http://schemas.microsoft.com/office/drawing/2014/main" id="{21A32905-E234-4DAB-9E87-4B8E49A5AA22}"/>
+              </a:ext>
+            </a:extLst>
+          </p:cNvPr>
+          <p:cNvCxnSpPr>
+            <a:cxnSpLocks/>
+          </p:cNvCxnSpPr>
+          <p:nvPr/>
+        </p:nvCxnSpPr>
+        <p:spPr>
+          <a:xfrm>
+            <a:off x="6386513" y="2656401"/>
+            <a:ext cx="200025" cy="0"/>
+          </a:xfrm>
+          <a:prstGeom prst="line">
+            <a:avLst/>
+          </a:prstGeom>
+        </p:spPr>
+        <p:style>
+          <a:lnRef idx="1">
+            <a:schemeClr val="accent1"/>
+          </a:lnRef>
+          <a:fillRef idx="0">
+            <a:schemeClr val="accent1"/>
+          </a:fillRef>
+          <a:effectRef idx="0">
+            <a:schemeClr val="accent1"/>
+          </a:effectRef>
+          <a:fontRef idx="minor">
+            <a:schemeClr val="tx1"/>
+          </a:fontRef>
+        </p:style>
+      </p:cxnSp>
+      <p:cxnSp>
+        <p:nvCxnSpPr>
+          <p:cNvPr id="30" name="Straight Connector 29">
+            <a:extLst>
+              <a:ext uri="{FF2B5EF4-FFF2-40B4-BE49-F238E27FC236}">
+                <a16:creationId xmlns:a16="http://schemas.microsoft.com/office/drawing/2014/main" id="{9668FD08-2B24-49CA-8376-5C67CD3A97CA}"/>
+              </a:ext>
+            </a:extLst>
+          </p:cNvPr>
+          <p:cNvCxnSpPr>
+            <a:cxnSpLocks/>
+          </p:cNvCxnSpPr>
+          <p:nvPr/>
+        </p:nvCxnSpPr>
+        <p:spPr>
+          <a:xfrm>
+            <a:off x="6386513" y="4314825"/>
+            <a:ext cx="185737" cy="0"/>
+          </a:xfrm>
+          <a:prstGeom prst="line">
+            <a:avLst/>
+          </a:prstGeom>
+        </p:spPr>
+        <p:style>
+          <a:lnRef idx="1">
+            <a:schemeClr val="accent1"/>
+          </a:lnRef>
+          <a:fillRef idx="0">
+            <a:schemeClr val="accent1"/>
+          </a:fillRef>
+          <a:effectRef idx="0">
+            <a:schemeClr val="accent1"/>
+          </a:effectRef>
+          <a:fontRef idx="minor">
+            <a:schemeClr val="tx1"/>
+          </a:fontRef>
+        </p:style>
+      </p:cxnSp>
+      <p:cxnSp>
+        <p:nvCxnSpPr>
+          <p:cNvPr id="32" name="Straight Connector 31">
+            <a:extLst>
+              <a:ext uri="{FF2B5EF4-FFF2-40B4-BE49-F238E27FC236}">
+                <a16:creationId xmlns:a16="http://schemas.microsoft.com/office/drawing/2014/main" id="{6FAF265F-7034-4020-BF73-2B519A8DBB25}"/>
+              </a:ext>
+            </a:extLst>
+          </p:cNvPr>
+          <p:cNvCxnSpPr>
+            <a:cxnSpLocks/>
+          </p:cNvCxnSpPr>
+          <p:nvPr/>
+        </p:nvCxnSpPr>
+        <p:spPr>
+          <a:xfrm flipH="1">
+            <a:off x="6572250" y="2656401"/>
+            <a:ext cx="14288" cy="1672712"/>
+          </a:xfrm>
+          <a:prstGeom prst="line">
+            <a:avLst/>
+          </a:prstGeom>
+        </p:spPr>
+        <p:style>
+          <a:lnRef idx="1">
+            <a:schemeClr val="accent1"/>
+          </a:lnRef>
+          <a:fillRef idx="0">
+            <a:schemeClr val="accent1"/>
+          </a:fillRef>
+          <a:effectRef idx="0">
+            <a:schemeClr val="accent1"/>
+          </a:effectRef>
+          <a:fontRef idx="minor">
+            <a:schemeClr val="tx1"/>
+          </a:fontRef>
+        </p:style>
+      </p:cxnSp>
+      <p:cxnSp>
+        <p:nvCxnSpPr>
+          <p:cNvPr id="34" name="Straight Arrow Connector 33">
+            <a:extLst>
+              <a:ext uri="{FF2B5EF4-FFF2-40B4-BE49-F238E27FC236}">
+                <a16:creationId xmlns:a16="http://schemas.microsoft.com/office/drawing/2014/main" id="{218F4940-83B8-4B3A-931C-95012B05C315}"/>
+              </a:ext>
+            </a:extLst>
+          </p:cNvPr>
+          <p:cNvCxnSpPr>
+            <a:cxnSpLocks/>
+          </p:cNvCxnSpPr>
+          <p:nvPr/>
+        </p:nvCxnSpPr>
+        <p:spPr>
+          <a:xfrm>
+            <a:off x="6586538" y="3492757"/>
+            <a:ext cx="1400173" cy="0"/>
+          </a:xfrm>
+          <a:prstGeom prst="straightConnector1">
+            <a:avLst/>
+          </a:prstGeom>
+          <a:ln>
+            <a:tailEnd type="triangle"/>
+          </a:ln>
+        </p:spPr>
+        <p:style>
+          <a:lnRef idx="1">
+            <a:schemeClr val="accent1"/>
+          </a:lnRef>
+          <a:fillRef idx="0">
+            <a:schemeClr val="accent1"/>
+          </a:fillRef>
+          <a:effectRef idx="0">
+            <a:schemeClr val="accent1"/>
+          </a:effectRef>
+          <a:fontRef idx="minor">
+            <a:schemeClr val="tx1"/>
+          </a:fontRef>
+        </p:style>
+      </p:cxnSp>
+      <p:cxnSp>
+        <p:nvCxnSpPr>
+          <p:cNvPr id="36" name="Straight Connector 35">
+            <a:extLst>
+              <a:ext uri="{FF2B5EF4-FFF2-40B4-BE49-F238E27FC236}">
+                <a16:creationId xmlns:a16="http://schemas.microsoft.com/office/drawing/2014/main" id="{A6BF9318-5BBD-4AFF-9DC5-A795C44870F8}"/>
+              </a:ext>
+            </a:extLst>
+          </p:cNvPr>
+          <p:cNvCxnSpPr>
+            <a:cxnSpLocks/>
+          </p:cNvCxnSpPr>
+          <p:nvPr/>
+        </p:nvCxnSpPr>
+        <p:spPr>
+          <a:xfrm>
+            <a:off x="9501188" y="1463953"/>
+            <a:ext cx="0" cy="4608631"/>
+          </a:xfrm>
+          <a:prstGeom prst="line">
+            <a:avLst/>
+          </a:prstGeom>
+        </p:spPr>
+        <p:style>
+          <a:lnRef idx="1">
+            <a:schemeClr val="accent1"/>
+          </a:lnRef>
+          <a:fillRef idx="0">
+            <a:schemeClr val="accent1"/>
+          </a:fillRef>
+          <a:effectRef idx="0">
+            <a:schemeClr val="accent1"/>
+          </a:effectRef>
+          <a:fontRef idx="minor">
+            <a:schemeClr val="tx1"/>
+          </a:fontRef>
+        </p:style>
+      </p:cxnSp>
+      <p:cxnSp>
+        <p:nvCxnSpPr>
+          <p:cNvPr id="38" name="Straight Arrow Connector 37">
+            <a:extLst>
+              <a:ext uri="{FF2B5EF4-FFF2-40B4-BE49-F238E27FC236}">
+                <a16:creationId xmlns:a16="http://schemas.microsoft.com/office/drawing/2014/main" id="{0A2BC275-B722-49CA-8272-3B207FFDF787}"/>
+              </a:ext>
+            </a:extLst>
+          </p:cNvPr>
+          <p:cNvCxnSpPr>
+            <a:cxnSpLocks/>
+          </p:cNvCxnSpPr>
+          <p:nvPr/>
+        </p:nvCxnSpPr>
+        <p:spPr>
+          <a:xfrm>
+            <a:off x="9501188" y="1463953"/>
+            <a:ext cx="567076" cy="0"/>
+          </a:xfrm>
+          <a:prstGeom prst="straightConnector1">
+            <a:avLst/>
+          </a:prstGeom>
+          <a:ln>
+            <a:tailEnd type="triangle"/>
+          </a:ln>
+        </p:spPr>
+        <p:style>
+          <a:lnRef idx="1">
+            <a:schemeClr val="accent1"/>
+          </a:lnRef>
+          <a:fillRef idx="0">
+            <a:schemeClr val="accent1"/>
+          </a:fillRef>
+          <a:effectRef idx="0">
+            <a:schemeClr val="accent1"/>
+          </a:effectRef>
+          <a:fontRef idx="minor">
+            <a:schemeClr val="tx1"/>
+          </a:fontRef>
+        </p:style>
+      </p:cxnSp>
+      <p:cxnSp>
+        <p:nvCxnSpPr>
+          <p:cNvPr id="40" name="Straight Arrow Connector 39">
+            <a:extLst>
+              <a:ext uri="{FF2B5EF4-FFF2-40B4-BE49-F238E27FC236}">
+                <a16:creationId xmlns:a16="http://schemas.microsoft.com/office/drawing/2014/main" id="{2F0F8F26-7AC1-405C-A668-FB0D60CD3482}"/>
+              </a:ext>
+            </a:extLst>
+          </p:cNvPr>
+          <p:cNvCxnSpPr>
+            <a:cxnSpLocks/>
+          </p:cNvCxnSpPr>
+          <p:nvPr/>
+        </p:nvCxnSpPr>
+        <p:spPr>
+          <a:xfrm>
+            <a:off x="9501188" y="2656401"/>
+            <a:ext cx="567076" cy="0"/>
+          </a:xfrm>
+          <a:prstGeom prst="straightConnector1">
+            <a:avLst/>
+          </a:prstGeom>
+          <a:ln>
+            <a:tailEnd type="triangle"/>
+          </a:ln>
+        </p:spPr>
+        <p:style>
+          <a:lnRef idx="1">
+            <a:schemeClr val="accent1"/>
+          </a:lnRef>
+          <a:fillRef idx="0">
+            <a:schemeClr val="accent1"/>
+          </a:fillRef>
+          <a:effectRef idx="0">
+            <a:schemeClr val="accent1"/>
+          </a:effectRef>
+          <a:fontRef idx="minor">
+            <a:schemeClr val="tx1"/>
+          </a:fontRef>
+        </p:style>
+      </p:cxnSp>
+      <p:cxnSp>
+        <p:nvCxnSpPr>
+          <p:cNvPr id="42" name="Straight Arrow Connector 41">
+            <a:extLst>
+              <a:ext uri="{FF2B5EF4-FFF2-40B4-BE49-F238E27FC236}">
+                <a16:creationId xmlns:a16="http://schemas.microsoft.com/office/drawing/2014/main" id="{9C1038B8-4263-404D-9A6C-7316F44FEFF6}"/>
+              </a:ext>
+            </a:extLst>
+          </p:cNvPr>
+          <p:cNvCxnSpPr>
+            <a:cxnSpLocks/>
+          </p:cNvCxnSpPr>
+          <p:nvPr/>
+        </p:nvCxnSpPr>
+        <p:spPr>
+          <a:xfrm>
+            <a:off x="9501188" y="3492757"/>
+            <a:ext cx="567076" cy="0"/>
+          </a:xfrm>
+          <a:prstGeom prst="straightConnector1">
+            <a:avLst/>
+          </a:prstGeom>
+          <a:ln>
+            <a:tailEnd type="triangle"/>
+          </a:ln>
+        </p:spPr>
+        <p:style>
+          <a:lnRef idx="1">
+            <a:schemeClr val="accent1"/>
+          </a:lnRef>
+          <a:fillRef idx="0">
+            <a:schemeClr val="accent1"/>
+          </a:fillRef>
+          <a:effectRef idx="0">
+            <a:schemeClr val="accent1"/>
+          </a:effectRef>
+          <a:fontRef idx="minor">
+            <a:schemeClr val="tx1"/>
+          </a:fontRef>
+        </p:style>
+      </p:cxnSp>
+      <p:cxnSp>
+        <p:nvCxnSpPr>
+          <p:cNvPr id="44" name="Straight Arrow Connector 43">
+            <a:extLst>
+              <a:ext uri="{FF2B5EF4-FFF2-40B4-BE49-F238E27FC236}">
+                <a16:creationId xmlns:a16="http://schemas.microsoft.com/office/drawing/2014/main" id="{B8D0B936-8F6D-4E44-807F-D54250B1C80C}"/>
+              </a:ext>
+            </a:extLst>
+          </p:cNvPr>
+          <p:cNvCxnSpPr>
+            <a:cxnSpLocks/>
+          </p:cNvCxnSpPr>
+          <p:nvPr/>
+        </p:nvCxnSpPr>
+        <p:spPr>
+          <a:xfrm>
+            <a:off x="9501188" y="4489208"/>
+            <a:ext cx="567076" cy="0"/>
+          </a:xfrm>
+          <a:prstGeom prst="straightConnector1">
+            <a:avLst/>
+          </a:prstGeom>
+          <a:ln>
+            <a:tailEnd type="triangle"/>
+          </a:ln>
+        </p:spPr>
+        <p:style>
+          <a:lnRef idx="1">
+            <a:schemeClr val="accent1"/>
+          </a:lnRef>
+          <a:fillRef idx="0">
+            <a:schemeClr val="accent1"/>
+          </a:fillRef>
+          <a:effectRef idx="0">
+            <a:schemeClr val="accent1"/>
+          </a:effectRef>
+          <a:fontRef idx="minor">
+            <a:schemeClr val="tx1"/>
+          </a:fontRef>
+        </p:style>
+      </p:cxnSp>
+      <p:cxnSp>
+        <p:nvCxnSpPr>
+          <p:cNvPr id="46" name="Straight Arrow Connector 45">
+            <a:extLst>
+              <a:ext uri="{FF2B5EF4-FFF2-40B4-BE49-F238E27FC236}">
+                <a16:creationId xmlns:a16="http://schemas.microsoft.com/office/drawing/2014/main" id="{6E5DFD99-8CEF-4785-8DDF-68942FB85BFF}"/>
+              </a:ext>
+            </a:extLst>
+          </p:cNvPr>
+          <p:cNvCxnSpPr>
+            <a:cxnSpLocks/>
+          </p:cNvCxnSpPr>
+          <p:nvPr/>
+        </p:nvCxnSpPr>
+        <p:spPr>
+          <a:xfrm>
+            <a:off x="9501188" y="5197428"/>
+            <a:ext cx="567076" cy="0"/>
+          </a:xfrm>
+          <a:prstGeom prst="straightConnector1">
+            <a:avLst/>
+          </a:prstGeom>
+          <a:ln>
+            <a:tailEnd type="triangle"/>
+          </a:ln>
+        </p:spPr>
+        <p:style>
+          <a:lnRef idx="1">
+            <a:schemeClr val="accent1"/>
+          </a:lnRef>
+          <a:fillRef idx="0">
+            <a:schemeClr val="accent1"/>
+          </a:fillRef>
+          <a:effectRef idx="0">
+            <a:schemeClr val="accent1"/>
+          </a:effectRef>
+          <a:fontRef idx="minor">
+            <a:schemeClr val="tx1"/>
+          </a:fontRef>
+        </p:style>
+      </p:cxnSp>
+      <p:cxnSp>
+        <p:nvCxnSpPr>
+          <p:cNvPr id="48" name="Straight Arrow Connector 47">
+            <a:extLst>
+              <a:ext uri="{FF2B5EF4-FFF2-40B4-BE49-F238E27FC236}">
+                <a16:creationId xmlns:a16="http://schemas.microsoft.com/office/drawing/2014/main" id="{3C047F58-8236-4F99-851A-58DC607905A0}"/>
+              </a:ext>
+            </a:extLst>
+          </p:cNvPr>
+          <p:cNvCxnSpPr>
+            <a:cxnSpLocks/>
+          </p:cNvCxnSpPr>
+          <p:nvPr/>
+        </p:nvCxnSpPr>
+        <p:spPr>
+          <a:xfrm>
+            <a:off x="9501188" y="6072584"/>
+            <a:ext cx="567076" cy="0"/>
+          </a:xfrm>
+          <a:prstGeom prst="straightConnector1">
+            <a:avLst/>
+          </a:prstGeom>
+          <a:ln>
+            <a:tailEnd type="triangle"/>
+          </a:ln>
+        </p:spPr>
+        <p:style>
+          <a:lnRef idx="1">
+            <a:schemeClr val="accent1"/>
+          </a:lnRef>
+          <a:fillRef idx="0">
+            <a:schemeClr val="accent1"/>
+          </a:fillRef>
+          <a:effectRef idx="0">
+            <a:schemeClr val="accent1"/>
+          </a:effectRef>
+          <a:fontRef idx="minor">
+            <a:schemeClr val="tx1"/>
+          </a:fontRef>
+        </p:style>
+      </p:cxnSp>
+      <p:cxnSp>
+        <p:nvCxnSpPr>
+          <p:cNvPr id="51" name="Straight Connector 50">
+            <a:extLst>
+              <a:ext uri="{FF2B5EF4-FFF2-40B4-BE49-F238E27FC236}">
+                <a16:creationId xmlns:a16="http://schemas.microsoft.com/office/drawing/2014/main" id="{4C623B35-66DA-471D-8716-418D0D69E717}"/>
+              </a:ext>
+            </a:extLst>
+          </p:cNvPr>
+          <p:cNvCxnSpPr>
+            <a:cxnSpLocks/>
+          </p:cNvCxnSpPr>
+          <p:nvPr/>
+        </p:nvCxnSpPr>
+        <p:spPr>
+          <a:xfrm>
+            <a:off x="9201148" y="3740803"/>
+            <a:ext cx="300040" cy="0"/>
+          </a:xfrm>
+          <a:prstGeom prst="line">
+            <a:avLst/>
+          </a:prstGeom>
+        </p:spPr>
+        <p:style>
+          <a:lnRef idx="1">
+            <a:schemeClr val="accent1"/>
+          </a:lnRef>
+          <a:fillRef idx="0">
+            <a:schemeClr val="accent1"/>
+          </a:fillRef>
+          <a:effectRef idx="0">
+            <a:schemeClr val="accent1"/>
+          </a:effectRef>
+          <a:fontRef idx="minor">
+            <a:schemeClr val="tx1"/>
+          </a:fontRef>
+        </p:style>
+      </p:cxnSp>
+      <p:grpSp>
+        <p:nvGrpSpPr>
+          <p:cNvPr id="72" name="Group 71">
+            <a:extLst>
+              <a:ext uri="{FF2B5EF4-FFF2-40B4-BE49-F238E27FC236}">
+                <a16:creationId xmlns:a16="http://schemas.microsoft.com/office/drawing/2014/main" id="{8321F674-4DD0-4063-B593-1BEAF32B3CC0}"/>
+              </a:ext>
+            </a:extLst>
+          </p:cNvPr>
+          <p:cNvGrpSpPr/>
+          <p:nvPr/>
+        </p:nvGrpSpPr>
+        <p:grpSpPr>
+          <a:xfrm>
+            <a:off x="5455400" y="1324535"/>
+            <a:ext cx="6184490" cy="5077196"/>
+            <a:chOff x="5455400" y="1324535"/>
+            <a:chExt cx="6184490" cy="5077196"/>
+          </a:xfrm>
+        </p:grpSpPr>
+        <p:sp>
+          <p:nvSpPr>
+            <p:cNvPr id="4" name="Rectangle 3">
+              <a:extLst>
+                <a:ext uri="{FF2B5EF4-FFF2-40B4-BE49-F238E27FC236}">
+                  <a16:creationId xmlns:a16="http://schemas.microsoft.com/office/drawing/2014/main" id="{79725B1B-8E13-4F28-974F-2CA11997DD75}"/>
+                </a:ext>
+              </a:extLst>
+            </p:cNvPr>
+            <p:cNvSpPr/>
+            <p:nvPr/>
+          </p:nvSpPr>
+          <p:spPr>
+            <a:xfrm>
+              <a:off x="5472024" y="2041475"/>
+              <a:ext cx="914489" cy="860519"/>
+            </a:xfrm>
+            <a:prstGeom prst="rect">
+              <a:avLst/>
+            </a:prstGeom>
+          </p:spPr>
+          <p:style>
+            <a:lnRef idx="0">
+              <a:schemeClr val="accent5"/>
+            </a:lnRef>
+            <a:fillRef idx="3">
+              <a:schemeClr val="accent5"/>
+            </a:fillRef>
+            <a:effectRef idx="3">
+              <a:schemeClr val="accent5"/>
+            </a:effectRef>
+            <a:fontRef idx="minor">
+              <a:schemeClr val="lt1"/>
+            </a:fontRef>
+          </p:style>
+          <p:txBody>
+            <a:bodyPr rtlCol="0" anchor="ctr"/>
+            <a:lstStyle/>
+            <a:p>
+              <a:pPr algn="ctr"/>
+              <a:endParaRPr lang="en-IN"/>
+            </a:p>
+          </p:txBody>
+        </p:sp>
+        <p:sp>
+          <p:nvSpPr>
+            <p:cNvPr id="10" name="Rectangle 9">
+              <a:extLst>
+                <a:ext uri="{FF2B5EF4-FFF2-40B4-BE49-F238E27FC236}">
+                  <a16:creationId xmlns:a16="http://schemas.microsoft.com/office/drawing/2014/main" id="{A6A1AD71-0336-4550-8EB8-3373E4E8C326}"/>
+                </a:ext>
+              </a:extLst>
+            </p:cNvPr>
+            <p:cNvSpPr/>
+            <p:nvPr/>
+          </p:nvSpPr>
+          <p:spPr>
+            <a:xfrm>
+              <a:off x="5455400" y="3897218"/>
+              <a:ext cx="914489" cy="860519"/>
+            </a:xfrm>
+            <a:prstGeom prst="rect">
+              <a:avLst/>
+            </a:prstGeom>
+          </p:spPr>
+          <p:style>
+            <a:lnRef idx="0">
+              <a:schemeClr val="accent5"/>
+            </a:lnRef>
+            <a:fillRef idx="3">
+              <a:schemeClr val="accent5"/>
+            </a:fillRef>
+            <a:effectRef idx="3">
+              <a:schemeClr val="accent5"/>
+            </a:effectRef>
+            <a:fontRef idx="minor">
+              <a:schemeClr val="lt1"/>
+            </a:fontRef>
+          </p:style>
+          <p:txBody>
+            <a:bodyPr rtlCol="0" anchor="ctr"/>
+            <a:lstStyle/>
+            <a:p>
+              <a:pPr algn="ctr"/>
+              <a:endParaRPr lang="en-IN"/>
+            </a:p>
+          </p:txBody>
+        </p:sp>
+        <p:sp>
+          <p:nvSpPr>
+            <p:cNvPr id="5" name="TextBox 4">
+              <a:extLst>
+                <a:ext uri="{FF2B5EF4-FFF2-40B4-BE49-F238E27FC236}">
+                  <a16:creationId xmlns:a16="http://schemas.microsoft.com/office/drawing/2014/main" id="{4F968DBF-0A09-4A43-A09F-74C02A2E7B8C}"/>
+                </a:ext>
+              </a:extLst>
+            </p:cNvPr>
+            <p:cNvSpPr txBox="1"/>
+            <p:nvPr/>
+          </p:nvSpPr>
+          <p:spPr>
+            <a:xfrm>
+              <a:off x="5591000" y="2287069"/>
+              <a:ext cx="795513" cy="369332"/>
+            </a:xfrm>
+            <a:prstGeom prst="rect">
+              <a:avLst/>
+            </a:prstGeom>
+            <a:noFill/>
+          </p:spPr>
+          <p:txBody>
+            <a:bodyPr wrap="square" rtlCol="0">
+              <a:spAutoFit/>
+            </a:bodyPr>
+            <a:lstStyle/>
+            <a:p>
+              <a:r>
+                <a:rPr lang="en-US" dirty="0">
+                  <a:solidFill>
+                    <a:schemeClr val="bg1"/>
+                  </a:solidFill>
+                </a:rPr>
+                <a:t>App 1</a:t>
+              </a:r>
+              <a:endParaRPr lang="en-IN" dirty="0">
+                <a:solidFill>
+                  <a:schemeClr val="bg1"/>
+                </a:solidFill>
+              </a:endParaRPr>
+            </a:p>
+          </p:txBody>
+        </p:sp>
+        <p:sp>
+          <p:nvSpPr>
+            <p:cNvPr id="11" name="TextBox 10">
+              <a:extLst>
+                <a:ext uri="{FF2B5EF4-FFF2-40B4-BE49-F238E27FC236}">
+                  <a16:creationId xmlns:a16="http://schemas.microsoft.com/office/drawing/2014/main" id="{5A7242B8-1265-4551-9E41-AFC322F613D6}"/>
+                </a:ext>
+              </a:extLst>
+            </p:cNvPr>
+            <p:cNvSpPr txBox="1"/>
+            <p:nvPr/>
+          </p:nvSpPr>
+          <p:spPr>
+            <a:xfrm>
+              <a:off x="5548267" y="4142812"/>
+              <a:ext cx="838246" cy="369332"/>
+            </a:xfrm>
+            <a:prstGeom prst="rect">
+              <a:avLst/>
+            </a:prstGeom>
+            <a:noFill/>
+          </p:spPr>
+          <p:txBody>
+            <a:bodyPr wrap="square" rtlCol="0">
+              <a:spAutoFit/>
+            </a:bodyPr>
+            <a:lstStyle/>
+            <a:p>
+              <a:r>
+                <a:rPr lang="en-US" dirty="0">
+                  <a:solidFill>
+                    <a:schemeClr val="bg1"/>
+                  </a:solidFill>
+                </a:rPr>
+                <a:t>App 2</a:t>
+              </a:r>
+              <a:endParaRPr lang="en-IN" dirty="0">
+                <a:solidFill>
+                  <a:schemeClr val="bg1"/>
+                </a:solidFill>
+              </a:endParaRPr>
+            </a:p>
+          </p:txBody>
+        </p:sp>
+        <p:sp>
+          <p:nvSpPr>
+            <p:cNvPr id="8" name="Rectangle 7">
+              <a:extLst>
+                <a:ext uri="{FF2B5EF4-FFF2-40B4-BE49-F238E27FC236}">
+                  <a16:creationId xmlns:a16="http://schemas.microsoft.com/office/drawing/2014/main" id="{5CA5DE2A-11F0-4F1E-9B66-4381321E8F59}"/>
+                </a:ext>
+              </a:extLst>
+            </p:cNvPr>
+            <p:cNvSpPr/>
+            <p:nvPr/>
+          </p:nvSpPr>
+          <p:spPr>
+            <a:xfrm>
+              <a:off x="7986711" y="3171825"/>
+              <a:ext cx="1214438" cy="860519"/>
+            </a:xfrm>
+            <a:prstGeom prst="rect">
+              <a:avLst/>
+            </a:prstGeom>
+          </p:spPr>
+          <p:style>
+            <a:lnRef idx="0">
+              <a:schemeClr val="accent2"/>
+            </a:lnRef>
+            <a:fillRef idx="3">
+              <a:schemeClr val="accent2"/>
+            </a:fillRef>
+            <a:effectRef idx="3">
+              <a:schemeClr val="accent2"/>
+            </a:effectRef>
+            <a:fontRef idx="minor">
+              <a:schemeClr val="lt1"/>
+            </a:fontRef>
+          </p:style>
+          <p:txBody>
+            <a:bodyPr rtlCol="0" anchor="ctr"/>
+            <a:lstStyle/>
+            <a:p>
+              <a:pPr algn="ctr"/>
+              <a:endParaRPr lang="en-IN"/>
+            </a:p>
+          </p:txBody>
+        </p:sp>
+        <p:sp>
+          <p:nvSpPr>
+            <p:cNvPr id="13" name="TextBox 12">
+              <a:extLst>
+                <a:ext uri="{FF2B5EF4-FFF2-40B4-BE49-F238E27FC236}">
+                  <a16:creationId xmlns:a16="http://schemas.microsoft.com/office/drawing/2014/main" id="{50D69191-E213-44EF-B2DB-FCDC3DE87D4E}"/>
+                </a:ext>
+              </a:extLst>
+            </p:cNvPr>
+            <p:cNvSpPr txBox="1"/>
+            <p:nvPr/>
+          </p:nvSpPr>
+          <p:spPr>
+            <a:xfrm>
+              <a:off x="7986711" y="3268930"/>
+              <a:ext cx="1214437" cy="646331"/>
+            </a:xfrm>
+            <a:prstGeom prst="rect">
+              <a:avLst/>
+            </a:prstGeom>
+            <a:noFill/>
+          </p:spPr>
+          <p:txBody>
+            <a:bodyPr wrap="square" rtlCol="0">
+              <a:spAutoFit/>
+            </a:bodyPr>
+            <a:lstStyle/>
+            <a:p>
+              <a:pPr algn="ctr"/>
+              <a:r>
+                <a:rPr lang="en-US" dirty="0">
+                  <a:solidFill>
+                    <a:schemeClr val="bg1"/>
+                  </a:solidFill>
+                </a:rPr>
+                <a:t>OTel</a:t>
+              </a:r>
+            </a:p>
+            <a:p>
+              <a:pPr algn="ctr"/>
+              <a:r>
+                <a:rPr lang="en-US" dirty="0">
+                  <a:solidFill>
+                    <a:schemeClr val="bg1"/>
+                  </a:solidFill>
+                </a:rPr>
+                <a:t>Collector</a:t>
+              </a:r>
+              <a:endParaRPr lang="en-IN" dirty="0">
+                <a:solidFill>
+                  <a:schemeClr val="bg1"/>
+                </a:solidFill>
+              </a:endParaRPr>
+            </a:p>
+          </p:txBody>
+        </p:sp>
+        <p:sp>
+          <p:nvSpPr>
+            <p:cNvPr id="14" name="Rectangle 13">
+              <a:extLst>
+                <a:ext uri="{FF2B5EF4-FFF2-40B4-BE49-F238E27FC236}">
+                  <a16:creationId xmlns:a16="http://schemas.microsoft.com/office/drawing/2014/main" id="{6E321AD9-101D-4751-AB27-C876D5C5D4C0}"/>
+                </a:ext>
+              </a:extLst>
+            </p:cNvPr>
+            <p:cNvSpPr/>
+            <p:nvPr/>
+          </p:nvSpPr>
+          <p:spPr>
+            <a:xfrm>
+              <a:off x="10068264" y="1324535"/>
+              <a:ext cx="1571625" cy="658294"/>
+            </a:xfrm>
+            <a:prstGeom prst="rect">
+              <a:avLst/>
+            </a:prstGeom>
+            <a:solidFill>
+              <a:srgbClr val="FF0000"/>
+            </a:solidFill>
+          </p:spPr>
+          <p:style>
+            <a:lnRef idx="0">
+              <a:schemeClr val="accent2"/>
+            </a:lnRef>
+            <a:fillRef idx="3">
+              <a:schemeClr val="accent2"/>
+            </a:fillRef>
+            <a:effectRef idx="3">
+              <a:schemeClr val="accent2"/>
+            </a:effectRef>
+            <a:fontRef idx="minor">
+              <a:schemeClr val="lt1"/>
+            </a:fontRef>
+          </p:style>
+          <p:txBody>
+            <a:bodyPr rtlCol="0" anchor="ctr"/>
+            <a:lstStyle/>
+            <a:p>
+              <a:pPr algn="ctr"/>
+              <a:endParaRPr lang="en-IN" dirty="0"/>
+            </a:p>
+          </p:txBody>
+        </p:sp>
+        <p:sp>
+          <p:nvSpPr>
+            <p:cNvPr id="15" name="Rectangle 14">
+              <a:extLst>
+                <a:ext uri="{FF2B5EF4-FFF2-40B4-BE49-F238E27FC236}">
+                  <a16:creationId xmlns:a16="http://schemas.microsoft.com/office/drawing/2014/main" id="{21D02BD4-76CA-4006-A1EB-031B57A63DD0}"/>
+                </a:ext>
+              </a:extLst>
+            </p:cNvPr>
+            <p:cNvSpPr/>
+            <p:nvPr/>
+          </p:nvSpPr>
+          <p:spPr>
+            <a:xfrm>
+              <a:off x="10068264" y="2207353"/>
+              <a:ext cx="1571625" cy="658294"/>
+            </a:xfrm>
+            <a:prstGeom prst="rect">
+              <a:avLst/>
+            </a:prstGeom>
+            <a:solidFill>
+              <a:srgbClr val="FF0000"/>
+            </a:solidFill>
+          </p:spPr>
+          <p:style>
+            <a:lnRef idx="0">
+              <a:schemeClr val="accent2"/>
+            </a:lnRef>
+            <a:fillRef idx="3">
+              <a:schemeClr val="accent2"/>
+            </a:fillRef>
+            <a:effectRef idx="3">
+              <a:schemeClr val="accent2"/>
+            </a:effectRef>
+            <a:fontRef idx="minor">
+              <a:schemeClr val="lt1"/>
+            </a:fontRef>
+          </p:style>
+          <p:txBody>
+            <a:bodyPr rtlCol="0" anchor="ctr"/>
+            <a:lstStyle/>
+            <a:p>
+              <a:pPr algn="ctr"/>
+              <a:endParaRPr lang="en-IN"/>
+            </a:p>
+          </p:txBody>
+        </p:sp>
+        <p:sp>
+          <p:nvSpPr>
+            <p:cNvPr id="16" name="Rectangle 15">
+              <a:extLst>
+                <a:ext uri="{FF2B5EF4-FFF2-40B4-BE49-F238E27FC236}">
+                  <a16:creationId xmlns:a16="http://schemas.microsoft.com/office/drawing/2014/main" id="{C90F29B1-FD85-4EDD-88DD-FD72640870F1}"/>
+                </a:ext>
+              </a:extLst>
+            </p:cNvPr>
+            <p:cNvSpPr/>
+            <p:nvPr/>
+          </p:nvSpPr>
+          <p:spPr>
+            <a:xfrm>
+              <a:off x="10068264" y="3082509"/>
+              <a:ext cx="1571625" cy="658294"/>
+            </a:xfrm>
+            <a:prstGeom prst="rect">
+              <a:avLst/>
+            </a:prstGeom>
+            <a:solidFill>
+              <a:srgbClr val="FF0000"/>
+            </a:solidFill>
+          </p:spPr>
+          <p:style>
+            <a:lnRef idx="0">
+              <a:schemeClr val="accent2"/>
+            </a:lnRef>
+            <a:fillRef idx="3">
+              <a:schemeClr val="accent2"/>
+            </a:fillRef>
+            <a:effectRef idx="3">
+              <a:schemeClr val="accent2"/>
+            </a:effectRef>
+            <a:fontRef idx="minor">
+              <a:schemeClr val="lt1"/>
+            </a:fontRef>
+          </p:style>
+          <p:txBody>
+            <a:bodyPr rtlCol="0" anchor="ctr"/>
+            <a:lstStyle/>
+            <a:p>
+              <a:pPr algn="ctr"/>
+              <a:endParaRPr lang="en-IN"/>
+            </a:p>
+          </p:txBody>
+        </p:sp>
+        <p:sp>
+          <p:nvSpPr>
+            <p:cNvPr id="17" name="Rectangle 16">
+              <a:extLst>
+                <a:ext uri="{FF2B5EF4-FFF2-40B4-BE49-F238E27FC236}">
+                  <a16:creationId xmlns:a16="http://schemas.microsoft.com/office/drawing/2014/main" id="{37C06E3E-0C52-4FCC-8F8C-D35BFC9AC902}"/>
+                </a:ext>
+              </a:extLst>
+            </p:cNvPr>
+            <p:cNvSpPr/>
+            <p:nvPr/>
+          </p:nvSpPr>
+          <p:spPr>
+            <a:xfrm>
+              <a:off x="10068264" y="3993125"/>
+              <a:ext cx="1571625" cy="658294"/>
+            </a:xfrm>
+            <a:prstGeom prst="rect">
+              <a:avLst/>
+            </a:prstGeom>
+            <a:solidFill>
+              <a:srgbClr val="FF0000"/>
+            </a:solidFill>
+          </p:spPr>
+          <p:style>
+            <a:lnRef idx="0">
+              <a:schemeClr val="accent2"/>
+            </a:lnRef>
+            <a:fillRef idx="3">
+              <a:schemeClr val="accent2"/>
+            </a:fillRef>
+            <a:effectRef idx="3">
+              <a:schemeClr val="accent2"/>
+            </a:effectRef>
+            <a:fontRef idx="minor">
+              <a:schemeClr val="lt1"/>
+            </a:fontRef>
+          </p:style>
+          <p:txBody>
+            <a:bodyPr rtlCol="0" anchor="ctr"/>
+            <a:lstStyle/>
+            <a:p>
+              <a:pPr algn="ctr"/>
+              <a:endParaRPr lang="en-IN"/>
+            </a:p>
+          </p:txBody>
+        </p:sp>
+        <p:sp>
+          <p:nvSpPr>
+            <p:cNvPr id="18" name="Rectangle 17">
+              <a:extLst>
+                <a:ext uri="{FF2B5EF4-FFF2-40B4-BE49-F238E27FC236}">
+                  <a16:creationId xmlns:a16="http://schemas.microsoft.com/office/drawing/2014/main" id="{B8AFFA21-6954-443B-A923-1F2E9FF7400E}"/>
+                </a:ext>
+              </a:extLst>
+            </p:cNvPr>
+            <p:cNvSpPr/>
+            <p:nvPr/>
+          </p:nvSpPr>
+          <p:spPr>
+            <a:xfrm>
+              <a:off x="10068264" y="4868281"/>
+              <a:ext cx="1571625" cy="658294"/>
+            </a:xfrm>
+            <a:prstGeom prst="rect">
+              <a:avLst/>
+            </a:prstGeom>
+            <a:solidFill>
+              <a:srgbClr val="FF0000"/>
+            </a:solidFill>
+          </p:spPr>
+          <p:style>
+            <a:lnRef idx="0">
+              <a:schemeClr val="accent2"/>
+            </a:lnRef>
+            <a:fillRef idx="3">
+              <a:schemeClr val="accent2"/>
+            </a:fillRef>
+            <a:effectRef idx="3">
+              <a:schemeClr val="accent2"/>
+            </a:effectRef>
+            <a:fontRef idx="minor">
+              <a:schemeClr val="lt1"/>
+            </a:fontRef>
+          </p:style>
+          <p:txBody>
+            <a:bodyPr rtlCol="0" anchor="ctr"/>
+            <a:lstStyle/>
+            <a:p>
+              <a:pPr algn="ctr"/>
+              <a:endParaRPr lang="en-IN"/>
+            </a:p>
+          </p:txBody>
+        </p:sp>
+        <p:sp>
+          <p:nvSpPr>
+            <p:cNvPr id="19" name="Rectangle 18">
+              <a:extLst>
+                <a:ext uri="{FF2B5EF4-FFF2-40B4-BE49-F238E27FC236}">
+                  <a16:creationId xmlns:a16="http://schemas.microsoft.com/office/drawing/2014/main" id="{D5AB5FDA-69F7-46BC-9B69-E91E00BF2B1C}"/>
+                </a:ext>
+              </a:extLst>
+            </p:cNvPr>
+            <p:cNvSpPr/>
+            <p:nvPr/>
+          </p:nvSpPr>
+          <p:spPr>
+            <a:xfrm>
+              <a:off x="10068265" y="5743437"/>
+              <a:ext cx="1571625" cy="658294"/>
+            </a:xfrm>
+            <a:prstGeom prst="rect">
+              <a:avLst/>
+            </a:prstGeom>
+            <a:solidFill>
+              <a:srgbClr val="FF0000"/>
+            </a:solidFill>
+          </p:spPr>
+          <p:style>
+            <a:lnRef idx="0">
+              <a:schemeClr val="accent2"/>
+            </a:lnRef>
+            <a:fillRef idx="3">
+              <a:schemeClr val="accent2"/>
+            </a:fillRef>
+            <a:effectRef idx="3">
+              <a:schemeClr val="accent2"/>
+            </a:effectRef>
+            <a:fontRef idx="minor">
+              <a:schemeClr val="lt1"/>
+            </a:fontRef>
+          </p:style>
+          <p:txBody>
+            <a:bodyPr rtlCol="0" anchor="ctr"/>
+            <a:lstStyle/>
+            <a:p>
+              <a:pPr algn="ctr"/>
+              <a:endParaRPr lang="en-IN"/>
+            </a:p>
+          </p:txBody>
+        </p:sp>
+        <p:sp>
+          <p:nvSpPr>
+            <p:cNvPr id="21" name="TextBox 20">
+              <a:extLst>
+                <a:ext uri="{FF2B5EF4-FFF2-40B4-BE49-F238E27FC236}">
+                  <a16:creationId xmlns:a16="http://schemas.microsoft.com/office/drawing/2014/main" id="{8FFF8F5E-BA81-4121-9D43-13C8F11E169B}"/>
+                </a:ext>
+              </a:extLst>
+            </p:cNvPr>
+            <p:cNvSpPr txBox="1"/>
+            <p:nvPr/>
+          </p:nvSpPr>
+          <p:spPr>
+            <a:xfrm>
+              <a:off x="10196851" y="1463953"/>
+              <a:ext cx="1314450" cy="369332"/>
+            </a:xfrm>
+            <a:prstGeom prst="rect">
+              <a:avLst/>
+            </a:prstGeom>
+            <a:noFill/>
+          </p:spPr>
+          <p:txBody>
+            <a:bodyPr wrap="square" rtlCol="0">
+              <a:spAutoFit/>
+            </a:bodyPr>
+            <a:lstStyle/>
+            <a:p>
+              <a:r>
+                <a:rPr lang="en-US" dirty="0">
+                  <a:solidFill>
+                    <a:schemeClr val="bg1"/>
+                  </a:solidFill>
+                </a:rPr>
+                <a:t>Jaeger</a:t>
+              </a:r>
+              <a:endParaRPr lang="en-IN" dirty="0">
+                <a:solidFill>
+                  <a:schemeClr val="bg1"/>
+                </a:solidFill>
+              </a:endParaRPr>
+            </a:p>
+          </p:txBody>
+        </p:sp>
+        <p:sp>
+          <p:nvSpPr>
+            <p:cNvPr id="22" name="TextBox 21">
+              <a:extLst>
+                <a:ext uri="{FF2B5EF4-FFF2-40B4-BE49-F238E27FC236}">
+                  <a16:creationId xmlns:a16="http://schemas.microsoft.com/office/drawing/2014/main" id="{10B2BDA0-7121-4180-A90E-BE8E4831111B}"/>
+                </a:ext>
+              </a:extLst>
+            </p:cNvPr>
+            <p:cNvSpPr txBox="1"/>
+            <p:nvPr/>
+          </p:nvSpPr>
+          <p:spPr>
+            <a:xfrm>
+              <a:off x="10160745" y="2351834"/>
+              <a:ext cx="1314450" cy="369332"/>
+            </a:xfrm>
+            <a:prstGeom prst="rect">
+              <a:avLst/>
+            </a:prstGeom>
+            <a:noFill/>
+          </p:spPr>
+          <p:txBody>
+            <a:bodyPr wrap="square" rtlCol="0">
+              <a:spAutoFit/>
+            </a:bodyPr>
+            <a:lstStyle/>
+            <a:p>
+              <a:r>
+                <a:rPr lang="en-US" dirty="0">
+                  <a:solidFill>
+                    <a:schemeClr val="bg1"/>
+                  </a:solidFill>
+                </a:rPr>
+                <a:t>Zipkin</a:t>
+              </a:r>
+              <a:r>
+                <a:rPr lang="en-US" dirty="0"/>
+                <a:t> </a:t>
+              </a:r>
+              <a:endParaRPr lang="en-IN" dirty="0"/>
+            </a:p>
+          </p:txBody>
+        </p:sp>
+        <p:sp>
+          <p:nvSpPr>
+            <p:cNvPr id="23" name="TextBox 22">
+              <a:extLst>
+                <a:ext uri="{FF2B5EF4-FFF2-40B4-BE49-F238E27FC236}">
+                  <a16:creationId xmlns:a16="http://schemas.microsoft.com/office/drawing/2014/main" id="{5D830EC7-DB5B-4124-A6BB-E29FFA019B2D}"/>
+                </a:ext>
+              </a:extLst>
+            </p:cNvPr>
+            <p:cNvSpPr txBox="1"/>
+            <p:nvPr/>
+          </p:nvSpPr>
+          <p:spPr>
+            <a:xfrm>
+              <a:off x="10160745" y="3203818"/>
+              <a:ext cx="1314450" cy="369332"/>
+            </a:xfrm>
+            <a:prstGeom prst="rect">
+              <a:avLst/>
+            </a:prstGeom>
+            <a:noFill/>
+          </p:spPr>
+          <p:txBody>
+            <a:bodyPr wrap="square" rtlCol="0">
+              <a:spAutoFit/>
+            </a:bodyPr>
+            <a:lstStyle/>
+            <a:p>
+              <a:r>
+                <a:rPr lang="en-US" dirty="0">
+                  <a:solidFill>
+                    <a:schemeClr val="bg1"/>
+                  </a:solidFill>
+                </a:rPr>
+                <a:t>Prometheus</a:t>
+              </a:r>
+              <a:endParaRPr lang="en-IN" dirty="0">
+                <a:solidFill>
+                  <a:schemeClr val="bg1"/>
+                </a:solidFill>
+              </a:endParaRPr>
+            </a:p>
+          </p:txBody>
+        </p:sp>
+        <p:sp>
+          <p:nvSpPr>
+            <p:cNvPr id="24" name="TextBox 23">
+              <a:extLst>
+                <a:ext uri="{FF2B5EF4-FFF2-40B4-BE49-F238E27FC236}">
+                  <a16:creationId xmlns:a16="http://schemas.microsoft.com/office/drawing/2014/main" id="{9FA7F90B-FE75-41C8-8E27-1469F0E8AEBF}"/>
+                </a:ext>
+              </a:extLst>
+            </p:cNvPr>
+            <p:cNvSpPr txBox="1"/>
+            <p:nvPr/>
+          </p:nvSpPr>
+          <p:spPr>
+            <a:xfrm>
+              <a:off x="10068264" y="4119876"/>
+              <a:ext cx="1571625" cy="369332"/>
+            </a:xfrm>
+            <a:prstGeom prst="rect">
+              <a:avLst/>
+            </a:prstGeom>
+            <a:noFill/>
+          </p:spPr>
+          <p:txBody>
+            <a:bodyPr wrap="square" rtlCol="0">
+              <a:spAutoFit/>
+            </a:bodyPr>
+            <a:lstStyle/>
+            <a:p>
+              <a:r>
+                <a:rPr lang="en-US" dirty="0">
+                  <a:solidFill>
+                    <a:schemeClr val="bg1"/>
+                  </a:solidFill>
+                </a:rPr>
+                <a:t>Azure Monitor</a:t>
+              </a:r>
+              <a:endParaRPr lang="en-IN" dirty="0">
+                <a:solidFill>
+                  <a:schemeClr val="bg1"/>
+                </a:solidFill>
+              </a:endParaRPr>
+            </a:p>
+          </p:txBody>
+        </p:sp>
+        <p:sp>
+          <p:nvSpPr>
+            <p:cNvPr id="25" name="TextBox 24">
+              <a:extLst>
+                <a:ext uri="{FF2B5EF4-FFF2-40B4-BE49-F238E27FC236}">
+                  <a16:creationId xmlns:a16="http://schemas.microsoft.com/office/drawing/2014/main" id="{B9402BA2-3BA0-47B8-9DFF-5A12CA5B4C58}"/>
+                </a:ext>
+              </a:extLst>
+            </p:cNvPr>
+            <p:cNvSpPr txBox="1"/>
+            <p:nvPr/>
+          </p:nvSpPr>
+          <p:spPr>
+            <a:xfrm>
+              <a:off x="10160745" y="5024714"/>
+              <a:ext cx="1314450" cy="369332"/>
+            </a:xfrm>
+            <a:prstGeom prst="rect">
+              <a:avLst/>
+            </a:prstGeom>
+            <a:noFill/>
+          </p:spPr>
+          <p:txBody>
+            <a:bodyPr wrap="square" rtlCol="0">
+              <a:spAutoFit/>
+            </a:bodyPr>
+            <a:lstStyle/>
+            <a:p>
+              <a:r>
+                <a:rPr lang="en-US" dirty="0">
+                  <a:solidFill>
+                    <a:schemeClr val="bg1"/>
+                  </a:solidFill>
+                </a:rPr>
+                <a:t>Elastic APM</a:t>
+              </a:r>
+              <a:endParaRPr lang="en-IN" dirty="0">
+                <a:solidFill>
+                  <a:schemeClr val="bg1"/>
+                </a:solidFill>
+              </a:endParaRPr>
+            </a:p>
+          </p:txBody>
+        </p:sp>
+        <p:sp>
+          <p:nvSpPr>
+            <p:cNvPr id="26" name="TextBox 25">
+              <a:extLst>
+                <a:ext uri="{FF2B5EF4-FFF2-40B4-BE49-F238E27FC236}">
+                  <a16:creationId xmlns:a16="http://schemas.microsoft.com/office/drawing/2014/main" id="{6CADAF83-E960-430B-A62E-C7473F5F7124}"/>
+                </a:ext>
+              </a:extLst>
+            </p:cNvPr>
+            <p:cNvSpPr txBox="1"/>
+            <p:nvPr/>
+          </p:nvSpPr>
+          <p:spPr>
+            <a:xfrm>
+              <a:off x="10160745" y="5840899"/>
+              <a:ext cx="1479144" cy="369332"/>
+            </a:xfrm>
+            <a:prstGeom prst="rect">
+              <a:avLst/>
+            </a:prstGeom>
+            <a:noFill/>
+          </p:spPr>
+          <p:txBody>
+            <a:bodyPr wrap="square" rtlCol="0">
+              <a:spAutoFit/>
+            </a:bodyPr>
+            <a:lstStyle/>
+            <a:p>
+              <a:r>
+                <a:rPr lang="en-US" dirty="0">
+                  <a:solidFill>
+                    <a:schemeClr val="bg1"/>
+                  </a:solidFill>
+                </a:rPr>
+                <a:t>ELK &amp; Others</a:t>
+              </a:r>
+              <a:endParaRPr lang="en-IN" dirty="0">
+                <a:solidFill>
+                  <a:schemeClr val="bg1"/>
+                </a:solidFill>
+              </a:endParaRPr>
+            </a:p>
+          </p:txBody>
+        </p:sp>
+        <p:sp>
+          <p:nvSpPr>
+            <p:cNvPr id="52" name="TextBox 51">
+              <a:extLst>
+                <a:ext uri="{FF2B5EF4-FFF2-40B4-BE49-F238E27FC236}">
+                  <a16:creationId xmlns:a16="http://schemas.microsoft.com/office/drawing/2014/main" id="{43C80562-6ACF-48B2-8C09-AEF3D1AF4E75}"/>
+                </a:ext>
+              </a:extLst>
+            </p:cNvPr>
+            <p:cNvSpPr txBox="1"/>
+            <p:nvPr/>
+          </p:nvSpPr>
+          <p:spPr>
+            <a:xfrm>
+              <a:off x="6717465" y="3148031"/>
+              <a:ext cx="1026358" cy="646331"/>
+            </a:xfrm>
+            <a:prstGeom prst="rect">
+              <a:avLst/>
+            </a:prstGeom>
+            <a:noFill/>
+          </p:spPr>
+          <p:txBody>
+            <a:bodyPr wrap="square" rtlCol="0">
+              <a:spAutoFit/>
+            </a:bodyPr>
+            <a:lstStyle/>
+            <a:p>
+              <a:pPr algn="ctr"/>
+              <a:r>
+                <a:rPr lang="en-US" dirty="0">
+                  <a:solidFill>
+                    <a:srgbClr val="FF0000"/>
+                  </a:solidFill>
+                </a:rPr>
+                <a:t>OTel</a:t>
+              </a:r>
+            </a:p>
+            <a:p>
+              <a:pPr algn="ctr"/>
+              <a:r>
+                <a:rPr lang="en-US" dirty="0">
+                  <a:solidFill>
+                    <a:srgbClr val="FF0000"/>
+                  </a:solidFill>
+                </a:rPr>
+                <a:t>Protocol</a:t>
+              </a:r>
+              <a:endParaRPr lang="en-IN" dirty="0">
+                <a:solidFill>
+                  <a:srgbClr val="FF0000"/>
+                </a:solidFill>
+              </a:endParaRPr>
+            </a:p>
+          </p:txBody>
+        </p:sp>
+        <p:sp>
+          <p:nvSpPr>
+            <p:cNvPr id="53" name="TextBox 52">
+              <a:extLst>
+                <a:ext uri="{FF2B5EF4-FFF2-40B4-BE49-F238E27FC236}">
+                  <a16:creationId xmlns:a16="http://schemas.microsoft.com/office/drawing/2014/main" id="{63F154E4-8598-4F0D-A6E3-FB85484302D0}"/>
+                </a:ext>
+              </a:extLst>
+            </p:cNvPr>
+            <p:cNvSpPr txBox="1"/>
+            <p:nvPr/>
+          </p:nvSpPr>
+          <p:spPr>
+            <a:xfrm>
+              <a:off x="8001000" y="4157572"/>
+              <a:ext cx="1297813" cy="1200329"/>
+            </a:xfrm>
+            <a:prstGeom prst="rect">
+              <a:avLst/>
+            </a:prstGeom>
+            <a:noFill/>
+          </p:spPr>
+          <p:txBody>
+            <a:bodyPr wrap="square" rtlCol="0">
+              <a:spAutoFit/>
+            </a:bodyPr>
+            <a:lstStyle/>
+            <a:p>
+              <a:r>
+                <a:rPr lang="en-US" dirty="0">
+                  <a:solidFill>
+                    <a:schemeClr val="accent6">
+                      <a:lumMod val="75000"/>
+                    </a:schemeClr>
+                  </a:solidFill>
+                </a:rPr>
+                <a:t>Receive, Process,</a:t>
+              </a:r>
+            </a:p>
+            <a:p>
+              <a:r>
+                <a:rPr lang="en-US" dirty="0">
+                  <a:solidFill>
+                    <a:schemeClr val="accent6">
+                      <a:lumMod val="75000"/>
+                    </a:schemeClr>
+                  </a:solidFill>
+                </a:rPr>
+                <a:t>Analyze &amp;</a:t>
+              </a:r>
+            </a:p>
+            <a:p>
+              <a:r>
+                <a:rPr lang="en-US" dirty="0">
+                  <a:solidFill>
+                    <a:schemeClr val="accent6">
+                      <a:lumMod val="75000"/>
+                    </a:schemeClr>
+                  </a:solidFill>
+                </a:rPr>
+                <a:t>Export data</a:t>
+              </a:r>
+              <a:endParaRPr lang="en-IN" dirty="0">
+                <a:solidFill>
+                  <a:schemeClr val="accent6">
+                    <a:lumMod val="75000"/>
+                  </a:schemeClr>
+                </a:solidFill>
+              </a:endParaRPr>
+            </a:p>
+          </p:txBody>
+        </p:sp>
+      </p:grpSp>
     </p:spTree>
     <p:extLst>
       <p:ext uri="{BB962C8B-B14F-4D97-AF65-F5344CB8AC3E}">
@@ -17469,8 +18405,8 @@
         </p:nvSpPr>
         <p:spPr>
           <a:xfrm>
-            <a:off x="838201" y="1386929"/>
-            <a:ext cx="3888528" cy="5250108"/>
+            <a:off x="838200" y="1814513"/>
+            <a:ext cx="4726728" cy="4822524"/>
           </a:xfrm>
         </p:spPr>
         <p:txBody>
@@ -17499,19 +18435,6 @@
               </a:lnSpc>
             </a:pPr>
             <a:r>
-              <a:rPr lang="en-US" sz="2200" dirty="0">
-                <a:cs typeface="Calibri"/>
-              </a:rPr>
-              <a:t>Problem Statements</a:t>
-            </a:r>
-          </a:p>
-          <a:p>
-            <a:pPr>
-              <a:lnSpc>
-                <a:spcPct val="150000"/>
-              </a:lnSpc>
-            </a:pPr>
-            <a:r>
               <a:rPr lang="en-US" sz="2200" dirty="0"/>
               <a:t>Backend or opensource Tools</a:t>
             </a:r>
@@ -17527,11 +18450,8 @@
             </a:pPr>
             <a:r>
               <a:rPr lang="en-US" sz="2200" dirty="0"/>
-              <a:t>The Challenge: Integration with ASP.NET Core 6 Web API</a:t>
+              <a:t>Code View</a:t>
             </a:r>
-            <a:endParaRPr lang="en-US" sz="2200" dirty="0">
-              <a:cs typeface="Calibri"/>
-            </a:endParaRPr>
           </a:p>
           <a:p>
             <a:pPr>
@@ -17541,7 +18461,18 @@
             </a:pPr>
             <a:r>
               <a:rPr lang="en-US" sz="2200" dirty="0"/>
-              <a:t>Solution</a:t>
+              <a:t>The Applications &amp; OTel Architecture</a:t>
+            </a:r>
+          </a:p>
+          <a:p>
+            <a:pPr>
+              <a:lnSpc>
+                <a:spcPct val="150000"/>
+              </a:lnSpc>
+            </a:pPr>
+            <a:r>
+              <a:rPr lang="en-US" sz="2200" dirty="0"/>
+              <a:t>Docker &amp; Kubernetes (K8s)</a:t>
             </a:r>
           </a:p>
           <a:p>
@@ -18217,7 +19148,7 @@
           <a:lstStyle/>
           <a:p>
             <a:r>
-              <a:rPr lang="en-US" sz="2400">
+              <a:rPr lang="en-US" sz="2400" dirty="0">
                 <a:cs typeface="Calibri"/>
               </a:rPr>
               <a:t>It is an open-source observability framework.</a:t>
@@ -18225,7 +19156,7 @@
           </a:p>
           <a:p>
             <a:r>
-              <a:rPr lang="en-US" sz="2400">
+              <a:rPr lang="en-US" sz="2400" dirty="0">
                 <a:cs typeface="Calibri"/>
               </a:rPr>
               <a:t>It is a collection of tools, APIs and SDKs.</a:t>
@@ -18233,7 +19164,7 @@
           </a:p>
           <a:p>
             <a:r>
-              <a:rPr lang="en-US" sz="2400">
+              <a:rPr lang="en-US" sz="2400" dirty="0">
                 <a:cs typeface="Calibri"/>
               </a:rPr>
               <a:t>It is used to instrument, generate, collect and export telemetry data (metrics, logs and traces).</a:t>
@@ -18241,7 +19172,7 @@
           </a:p>
           <a:p>
             <a:r>
-              <a:rPr lang="en-US" sz="2400">
+              <a:rPr lang="en-US" sz="2400" dirty="0">
                 <a:cs typeface="Calibri"/>
               </a:rPr>
               <a:t>This helps us analyze our software's performance and behavior.</a:t>
@@ -18249,7 +19180,7 @@
           </a:p>
           <a:p>
             <a:r>
-              <a:rPr lang="en-US" sz="2400">
+              <a:rPr lang="en-US" sz="2400" dirty="0">
                 <a:cs typeface="Calibri"/>
               </a:rPr>
               <a:t>It is used to troubleshoot, debug and manage applications and their host environment.</a:t>
@@ -18257,7 +19188,7 @@
           </a:p>
           <a:p>
             <a:r>
-              <a:rPr lang="en-US" sz="2400">
+              <a:rPr lang="en-US" sz="2400" dirty="0">
                 <a:cs typeface="Calibri"/>
               </a:rPr>
               <a:t>It exports data to a variety of open-source and commercial backends.</a:t>
@@ -18279,498 +19210,6 @@
 </file>
 
 <file path=ppt/slides/slide4.xml><?xml version="1.0" encoding="utf-8"?>
-<p:sld xmlns:a="http://schemas.openxmlformats.org/drawingml/2006/main" xmlns:r="http://schemas.openxmlformats.org/officeDocument/2006/relationships" xmlns:p="http://schemas.openxmlformats.org/presentationml/2006/main">
-  <p:cSld>
-    <p:bg>
-      <p:bgPr>
-        <a:solidFill>
-          <a:schemeClr val="bg1"/>
-        </a:solidFill>
-        <a:effectLst/>
-      </p:bgPr>
-    </p:bg>
-    <p:spTree>
-      <p:nvGrpSpPr>
-        <p:cNvPr id="1" name=""/>
-        <p:cNvGrpSpPr/>
-        <p:nvPr/>
-      </p:nvGrpSpPr>
-      <p:grpSpPr>
-        <a:xfrm>
-          <a:off x="0" y="0"/>
-          <a:ext cx="0" cy="0"/>
-          <a:chOff x="0" y="0"/>
-          <a:chExt cx="0" cy="0"/>
-        </a:xfrm>
-      </p:grpSpPr>
-      <p:sp useBgFill="1">
-        <p:nvSpPr>
-          <p:cNvPr id="8" name="Rectangle 7">
-            <a:extLst>
-              <a:ext uri="{FF2B5EF4-FFF2-40B4-BE49-F238E27FC236}">
-                <a16:creationId xmlns:a16="http://schemas.microsoft.com/office/drawing/2014/main" id="{6A1473A6-3F22-483E-8A30-80B9D2B14592}"/>
-              </a:ext>
-              <a:ext uri="{C183D7F6-B498-43B3-948B-1728B52AA6E4}">
-                <adec:decorative xmlns:adec="http://schemas.microsoft.com/office/drawing/2017/decorative" val="1"/>
-              </a:ext>
-            </a:extLst>
-          </p:cNvPr>
-          <p:cNvSpPr>
-            <a:spLocks noGrp="1" noRot="1" noChangeAspect="1" noMove="1" noResize="1" noEditPoints="1" noAdjustHandles="1" noChangeArrowheads="1" noChangeShapeType="1" noTextEdit="1"/>
-          </p:cNvSpPr>
-          <p:nvPr>
-            <p:extLst>
-              <p:ext uri="{386F3935-93C4-4BCD-93E2-E3B085C9AB24}">
-                <p16:designElem xmlns:p16="http://schemas.microsoft.com/office/powerpoint/2015/main" val="1"/>
-              </p:ext>
-            </p:extLst>
-          </p:nvPr>
-        </p:nvSpPr>
-        <p:spPr>
-          <a:xfrm>
-            <a:off x="0" y="0"/>
-            <a:ext cx="12188952" cy="6858000"/>
-          </a:xfrm>
-          <a:prstGeom prst="rect">
-            <a:avLst/>
-          </a:prstGeom>
-          <a:ln>
-            <a:noFill/>
-          </a:ln>
-        </p:spPr>
-        <p:style>
-          <a:lnRef idx="2">
-            <a:schemeClr val="accent1">
-              <a:shade val="50000"/>
-            </a:schemeClr>
-          </a:lnRef>
-          <a:fillRef idx="1">
-            <a:schemeClr val="accent1"/>
-          </a:fillRef>
-          <a:effectRef idx="0">
-            <a:schemeClr val="accent1"/>
-          </a:effectRef>
-          <a:fontRef idx="minor">
-            <a:schemeClr val="lt1"/>
-          </a:fontRef>
-        </p:style>
-        <p:txBody>
-          <a:bodyPr rtlCol="0" anchor="ctr"/>
-          <a:lstStyle/>
-          <a:p>
-            <a:pPr algn="ctr"/>
-            <a:endParaRPr lang="en-US"/>
-          </a:p>
-        </p:txBody>
-      </p:sp>
-      <p:grpSp>
-        <p:nvGrpSpPr>
-          <p:cNvPr id="10" name="Group 9">
-            <a:extLst>
-              <a:ext uri="{FF2B5EF4-FFF2-40B4-BE49-F238E27FC236}">
-                <a16:creationId xmlns:a16="http://schemas.microsoft.com/office/drawing/2014/main" id="{AA1375E3-3E53-4D75-BAB7-E5929BFCB25F}"/>
-              </a:ext>
-              <a:ext uri="{C183D7F6-B498-43B3-948B-1728B52AA6E4}">
-                <adec:decorative xmlns:adec="http://schemas.microsoft.com/office/drawing/2017/decorative" val="1"/>
-              </a:ext>
-            </a:extLst>
-          </p:cNvPr>
-          <p:cNvGrpSpPr>
-            <a:grpSpLocks noGrp="1" noUngrp="1" noRot="1" noChangeAspect="1" noMove="1" noResize="1"/>
-          </p:cNvGrpSpPr>
-          <p:nvPr>
-            <p:extLst>
-              <p:ext uri="{386F3935-93C4-4BCD-93E2-E3B085C9AB24}">
-                <p16:designElem xmlns:p16="http://schemas.microsoft.com/office/powerpoint/2015/main" val="1"/>
-              </p:ext>
-            </p:extLst>
-          </p:nvPr>
-        </p:nvGrpSpPr>
-        <p:grpSpPr>
-          <a:xfrm flipH="1">
-            <a:off x="534368" y="563918"/>
-            <a:ext cx="4119932" cy="5978614"/>
-            <a:chOff x="7513372" y="803186"/>
-            <a:chExt cx="4163968" cy="5978614"/>
-          </a:xfrm>
-        </p:grpSpPr>
-        <p:sp>
-          <p:nvSpPr>
-            <p:cNvPr id="11" name="Freeform 6">
-              <a:extLst>
-                <a:ext uri="{FF2B5EF4-FFF2-40B4-BE49-F238E27FC236}">
-                  <a16:creationId xmlns:a16="http://schemas.microsoft.com/office/drawing/2014/main" id="{0BBEEF67-3DDF-46CF-8CD5-EA5F0E4FB07D}"/>
-                </a:ext>
-                <a:ext uri="{C183D7F6-B498-43B3-948B-1728B52AA6E4}">
-                  <adec:decorative xmlns:adec="http://schemas.microsoft.com/office/drawing/2017/decorative" val="1"/>
-                </a:ext>
-              </a:extLst>
-            </p:cNvPr>
-            <p:cNvSpPr>
-              <a:spLocks/>
-            </p:cNvSpPr>
-            <p:nvPr>
-              <p:extLst>
-                <p:ext uri="{386F3935-93C4-4BCD-93E2-E3B085C9AB24}">
-                  <p16:designElem xmlns:p16="http://schemas.microsoft.com/office/powerpoint/2015/main" val="1"/>
-                </p:ext>
-              </p:extLst>
-            </p:nvPr>
-          </p:nvSpPr>
-          <p:spPr bwMode="auto">
-            <a:xfrm>
-              <a:off x="10989586" y="1070835"/>
-              <a:ext cx="687754" cy="5710965"/>
-            </a:xfrm>
-            <a:custGeom>
-              <a:avLst/>
-              <a:gdLst>
-                <a:gd name="T0" fmla="*/ 414 w 414"/>
-                <a:gd name="T1" fmla="*/ 2447 h 2447"/>
-                <a:gd name="T2" fmla="*/ 0 w 414"/>
-                <a:gd name="T3" fmla="*/ 2247 h 2447"/>
-                <a:gd name="T4" fmla="*/ 0 w 414"/>
-                <a:gd name="T5" fmla="*/ 0 h 2447"/>
-                <a:gd name="T6" fmla="*/ 414 w 414"/>
-                <a:gd name="T7" fmla="*/ 200 h 2447"/>
-                <a:gd name="T8" fmla="*/ 414 w 414"/>
-                <a:gd name="T9" fmla="*/ 2447 h 2447"/>
-              </a:gdLst>
-              <a:ahLst/>
-              <a:cxnLst>
-                <a:cxn ang="0">
-                  <a:pos x="T0" y="T1"/>
-                </a:cxn>
-                <a:cxn ang="0">
-                  <a:pos x="T2" y="T3"/>
-                </a:cxn>
-                <a:cxn ang="0">
-                  <a:pos x="T4" y="T5"/>
-                </a:cxn>
-                <a:cxn ang="0">
-                  <a:pos x="T6" y="T7"/>
-                </a:cxn>
-                <a:cxn ang="0">
-                  <a:pos x="T8" y="T9"/>
-                </a:cxn>
-              </a:cxnLst>
-              <a:rect l="0" t="0" r="r" b="b"/>
-              <a:pathLst>
-                <a:path w="414" h="2447">
-                  <a:moveTo>
-                    <a:pt x="414" y="2447"/>
-                  </a:moveTo>
-                  <a:lnTo>
-                    <a:pt x="0" y="2247"/>
-                  </a:lnTo>
-                  <a:lnTo>
-                    <a:pt x="0" y="0"/>
-                  </a:lnTo>
-                  <a:lnTo>
-                    <a:pt x="414" y="200"/>
-                  </a:lnTo>
-                  <a:lnTo>
-                    <a:pt x="414" y="2447"/>
-                  </a:lnTo>
-                  <a:close/>
-                </a:path>
-              </a:pathLst>
-            </a:custGeom>
-            <a:solidFill>
-              <a:schemeClr val="accent1">
-                <a:lumMod val="75000"/>
-              </a:schemeClr>
-            </a:solidFill>
-            <a:ln>
-              <a:noFill/>
-            </a:ln>
-          </p:spPr>
-          <p:txBody>
-            <a:bodyPr vert="horz" wrap="square" lIns="91440" tIns="45720" rIns="91440" bIns="45720" numCol="1" anchor="t" anchorCtr="0" compatLnSpc="1">
-              <a:prstTxWarp prst="textNoShape">
-                <a:avLst/>
-              </a:prstTxWarp>
-            </a:bodyPr>
-            <a:lstStyle/>
-            <a:p>
-              <a:endParaRPr lang="en-US"/>
-            </a:p>
-          </p:txBody>
-        </p:sp>
-        <p:sp>
-          <p:nvSpPr>
-            <p:cNvPr id="12" name="Freeform 7">
-              <a:extLst>
-                <a:ext uri="{FF2B5EF4-FFF2-40B4-BE49-F238E27FC236}">
-                  <a16:creationId xmlns:a16="http://schemas.microsoft.com/office/drawing/2014/main" id="{8FAC1C95-F817-487C-B8B2-CF141FBB1C2E}"/>
-                </a:ext>
-                <a:ext uri="{C183D7F6-B498-43B3-948B-1728B52AA6E4}">
-                  <adec:decorative xmlns:adec="http://schemas.microsoft.com/office/drawing/2017/decorative" val="1"/>
-                </a:ext>
-              </a:extLst>
-            </p:cNvPr>
-            <p:cNvSpPr>
-              <a:spLocks/>
-            </p:cNvSpPr>
-            <p:nvPr>
-              <p:extLst>
-                <p:ext uri="{386F3935-93C4-4BCD-93E2-E3B085C9AB24}">
-                  <p16:designElem xmlns:p16="http://schemas.microsoft.com/office/powerpoint/2015/main" val="1"/>
-                </p:ext>
-              </p:extLst>
-            </p:nvPr>
-          </p:nvSpPr>
-          <p:spPr bwMode="auto">
-            <a:xfrm>
-              <a:off x="10988949" y="803186"/>
-              <a:ext cx="409371" cy="5521414"/>
-            </a:xfrm>
-            <a:custGeom>
-              <a:avLst/>
-              <a:gdLst>
-                <a:gd name="T0" fmla="*/ 209 w 209"/>
-                <a:gd name="T1" fmla="*/ 2246 h 2358"/>
-                <a:gd name="T2" fmla="*/ 0 w 209"/>
-                <a:gd name="T3" fmla="*/ 2358 h 2358"/>
-                <a:gd name="T4" fmla="*/ 0 w 209"/>
-                <a:gd name="T5" fmla="*/ 111 h 2358"/>
-                <a:gd name="T6" fmla="*/ 209 w 209"/>
-                <a:gd name="T7" fmla="*/ 0 h 2358"/>
-                <a:gd name="T8" fmla="*/ 209 w 209"/>
-                <a:gd name="T9" fmla="*/ 2246 h 2358"/>
-              </a:gdLst>
-              <a:ahLst/>
-              <a:cxnLst>
-                <a:cxn ang="0">
-                  <a:pos x="T0" y="T1"/>
-                </a:cxn>
-                <a:cxn ang="0">
-                  <a:pos x="T2" y="T3"/>
-                </a:cxn>
-                <a:cxn ang="0">
-                  <a:pos x="T4" y="T5"/>
-                </a:cxn>
-                <a:cxn ang="0">
-                  <a:pos x="T6" y="T7"/>
-                </a:cxn>
-                <a:cxn ang="0">
-                  <a:pos x="T8" y="T9"/>
-                </a:cxn>
-              </a:cxnLst>
-              <a:rect l="0" t="0" r="r" b="b"/>
-              <a:pathLst>
-                <a:path w="209" h="2358">
-                  <a:moveTo>
-                    <a:pt x="209" y="2246"/>
-                  </a:moveTo>
-                  <a:lnTo>
-                    <a:pt x="0" y="2358"/>
-                  </a:lnTo>
-                  <a:lnTo>
-                    <a:pt x="0" y="111"/>
-                  </a:lnTo>
-                  <a:lnTo>
-                    <a:pt x="209" y="0"/>
-                  </a:lnTo>
-                  <a:lnTo>
-                    <a:pt x="209" y="2246"/>
-                  </a:lnTo>
-                  <a:close/>
-                </a:path>
-              </a:pathLst>
-            </a:custGeom>
-            <a:solidFill>
-              <a:schemeClr val="accent1">
-                <a:lumMod val="50000"/>
-              </a:schemeClr>
-            </a:solidFill>
-            <a:ln>
-              <a:noFill/>
-            </a:ln>
-          </p:spPr>
-          <p:txBody>
-            <a:bodyPr vert="horz" wrap="square" lIns="91440" tIns="45720" rIns="91440" bIns="45720" numCol="1" anchor="t" anchorCtr="0" compatLnSpc="1">
-              <a:prstTxWarp prst="textNoShape">
-                <a:avLst/>
-              </a:prstTxWarp>
-            </a:bodyPr>
-            <a:lstStyle/>
-            <a:p>
-              <a:endParaRPr lang="en-US"/>
-            </a:p>
-          </p:txBody>
-        </p:sp>
-        <p:sp>
-          <p:nvSpPr>
-            <p:cNvPr id="13" name="Rectangle 8">
-              <a:extLst>
-                <a:ext uri="{FF2B5EF4-FFF2-40B4-BE49-F238E27FC236}">
-                  <a16:creationId xmlns:a16="http://schemas.microsoft.com/office/drawing/2014/main" id="{C2C5363A-D941-4AA1-8D38-D7E44A1E2E01}"/>
-                </a:ext>
-                <a:ext uri="{C183D7F6-B498-43B3-948B-1728B52AA6E4}">
-                  <adec:decorative xmlns:adec="http://schemas.microsoft.com/office/drawing/2017/decorative" val="1"/>
-                </a:ext>
-              </a:extLst>
-            </p:cNvPr>
-            <p:cNvSpPr>
-              <a:spLocks noChangeArrowheads="1"/>
-            </p:cNvSpPr>
-            <p:nvPr>
-              <p:extLst>
-                <p:ext uri="{386F3935-93C4-4BCD-93E2-E3B085C9AB24}">
-                  <p16:designElem xmlns:p16="http://schemas.microsoft.com/office/powerpoint/2015/main" val="1"/>
-                </p:ext>
-              </p:extLst>
-            </p:nvPr>
-          </p:nvSpPr>
-          <p:spPr bwMode="auto">
-            <a:xfrm>
-              <a:off x="7513372" y="804101"/>
-              <a:ext cx="3880238" cy="5251646"/>
-            </a:xfrm>
-            <a:prstGeom prst="rect">
-              <a:avLst/>
-            </a:prstGeom>
-            <a:solidFill>
-              <a:schemeClr val="accent1"/>
-            </a:solidFill>
-            <a:ln>
-              <a:noFill/>
-            </a:ln>
-          </p:spPr>
-          <p:txBody>
-            <a:bodyPr vert="horz" wrap="square" lIns="91440" tIns="45720" rIns="91440" bIns="45720" numCol="1" anchor="t" anchorCtr="0" compatLnSpc="1">
-              <a:prstTxWarp prst="textNoShape">
-                <a:avLst/>
-              </a:prstTxWarp>
-            </a:bodyPr>
-            <a:lstStyle/>
-            <a:p>
-              <a:endParaRPr lang="en-US"/>
-            </a:p>
-          </p:txBody>
-        </p:sp>
-      </p:grpSp>
-      <p:sp>
-        <p:nvSpPr>
-          <p:cNvPr id="2" name="Title 1">
-            <a:extLst>
-              <a:ext uri="{FF2B5EF4-FFF2-40B4-BE49-F238E27FC236}">
-                <a16:creationId xmlns:a16="http://schemas.microsoft.com/office/drawing/2014/main" id="{3E443DE9-AD63-0057-B24D-451E1909F978}"/>
-              </a:ext>
-            </a:extLst>
-          </p:cNvPr>
-          <p:cNvSpPr>
-            <a:spLocks noGrp="1"/>
-          </p:cNvSpPr>
-          <p:nvPr>
-            <p:ph type="title"/>
-          </p:nvPr>
-        </p:nvSpPr>
-        <p:spPr>
-          <a:xfrm>
-            <a:off x="1098468" y="885651"/>
-            <a:ext cx="3229803" cy="4624603"/>
-          </a:xfrm>
-        </p:spPr>
-        <p:txBody>
-          <a:bodyPr>
-            <a:normAutofit/>
-          </a:bodyPr>
-          <a:lstStyle/>
-          <a:p>
-            <a:r>
-              <a:rPr lang="en-US" dirty="0">
-                <a:solidFill>
-                  <a:srgbClr val="FFFFFF"/>
-                </a:solidFill>
-                <a:cs typeface="Calibri Light"/>
-              </a:rPr>
-              <a:t>Problem Statements</a:t>
-            </a:r>
-            <a:endParaRPr lang="en-US" dirty="0">
-              <a:solidFill>
-                <a:srgbClr val="FFFFFF"/>
-              </a:solidFill>
-            </a:endParaRPr>
-          </a:p>
-        </p:txBody>
-      </p:sp>
-      <p:sp>
-        <p:nvSpPr>
-          <p:cNvPr id="3" name="Content Placeholder 2">
-            <a:extLst>
-              <a:ext uri="{FF2B5EF4-FFF2-40B4-BE49-F238E27FC236}">
-                <a16:creationId xmlns:a16="http://schemas.microsoft.com/office/drawing/2014/main" id="{20F6F47C-34A5-1224-44CF-B35988CA6FF9}"/>
-              </a:ext>
-            </a:extLst>
-          </p:cNvPr>
-          <p:cNvSpPr>
-            <a:spLocks noGrp="1"/>
-          </p:cNvSpPr>
-          <p:nvPr>
-            <p:ph idx="1"/>
-          </p:nvPr>
-        </p:nvSpPr>
-        <p:spPr>
-          <a:xfrm>
-            <a:off x="4978708" y="885651"/>
-            <a:ext cx="6525220" cy="4616849"/>
-          </a:xfrm>
-        </p:spPr>
-        <p:txBody>
-          <a:bodyPr vert="horz" lIns="91440" tIns="45720" rIns="91440" bIns="45720" rtlCol="0" anchor="ctr">
-            <a:normAutofit/>
-          </a:bodyPr>
-          <a:lstStyle/>
-          <a:p>
-            <a:r>
-              <a:rPr lang="en-US" sz="2400" dirty="0">
-                <a:cs typeface="Calibri"/>
-              </a:rPr>
-              <a:t>To collect telemetry data, that is, logs, traces and metrics from APIs and from Worker Services.</a:t>
-            </a:r>
-          </a:p>
-          <a:p>
-            <a:r>
-              <a:rPr lang="en-US" sz="2400" dirty="0">
-                <a:cs typeface="Calibri"/>
-              </a:rPr>
-              <a:t>To send them to backend or to opensource tools, where the user would be able to view them conveniently.</a:t>
-            </a:r>
-          </a:p>
-          <a:p>
-            <a:r>
-              <a:rPr lang="en-US" sz="2400" dirty="0">
-                <a:cs typeface="Calibri"/>
-              </a:rPr>
-              <a:t>OTel sends telemetry data which comprises metrics, logs and traces.</a:t>
-            </a:r>
-          </a:p>
-          <a:p>
-            <a:r>
-              <a:rPr lang="en-US" sz="2400" dirty="0">
-                <a:cs typeface="Calibri"/>
-              </a:rPr>
-              <a:t>The challenge was to export them to Jaeger, Zipkin and ELK Stack and to also show the Prometheus metrics.</a:t>
-            </a:r>
-          </a:p>
-        </p:txBody>
-      </p:sp>
-    </p:spTree>
-    <p:extLst>
-      <p:ext uri="{BB962C8B-B14F-4D97-AF65-F5344CB8AC3E}">
-        <p14:creationId xmlns:p14="http://schemas.microsoft.com/office/powerpoint/2010/main" val="601531589"/>
-      </p:ext>
-    </p:extLst>
-  </p:cSld>
-  <p:clrMapOvr>
-    <a:masterClrMapping/>
-  </p:clrMapOvr>
-</p:sld>
-</file>
-
-<file path=ppt/slides/slide5.xml><?xml version="1.0" encoding="utf-8"?>
 <p:sld xmlns:a="http://schemas.openxmlformats.org/drawingml/2006/main" xmlns:r="http://schemas.openxmlformats.org/officeDocument/2006/relationships" xmlns:p="http://schemas.openxmlformats.org/presentationml/2006/main">
   <p:cSld>
     <p:spTree>
@@ -18809,12 +19248,12 @@
           <a:lstStyle/>
           <a:p>
             <a:r>
-              <a:rPr lang="en-US">
+              <a:rPr lang="en-US" dirty="0">
                 <a:cs typeface="Calibri Light"/>
               </a:rPr>
               <a:t>Backend or opensource Tools</a:t>
             </a:r>
-            <a:endParaRPr lang="en-US"/>
+            <a:endParaRPr lang="en-US" dirty="0"/>
           </a:p>
         </p:txBody>
       </p:sp>
@@ -18857,7 +19296,7 @@
 </p:sld>
 </file>
 
-<file path=ppt/slides/slide6.xml><?xml version="1.0" encoding="utf-8"?>
+<file path=ppt/slides/slide5.xml><?xml version="1.0" encoding="utf-8"?>
 <p:sld xmlns:a="http://schemas.openxmlformats.org/drawingml/2006/main" xmlns:r="http://schemas.openxmlformats.org/officeDocument/2006/relationships" xmlns:p="http://schemas.openxmlformats.org/presentationml/2006/main">
   <p:cSld>
     <p:bg>
@@ -19564,7 +20003,7 @@
 </p:sld>
 </file>
 
-<file path=ppt/slides/slide7.xml><?xml version="1.0" encoding="utf-8"?>
+<file path=ppt/slides/slide6.xml><?xml version="1.0" encoding="utf-8"?>
 <p:sld xmlns:a="http://schemas.openxmlformats.org/drawingml/2006/main" xmlns:r="http://schemas.openxmlformats.org/officeDocument/2006/relationships" xmlns:p="http://schemas.openxmlformats.org/presentationml/2006/main">
   <p:cSld>
     <p:spTree>
@@ -19651,7 +20090,7 @@
 </p:sld>
 </file>
 
-<file path=ppt/slides/slide8.xml><?xml version="1.0" encoding="utf-8"?>
+<file path=ppt/slides/slide7.xml><?xml version="1.0" encoding="utf-8"?>
 <p:sld xmlns:a="http://schemas.openxmlformats.org/drawingml/2006/main" xmlns:r="http://schemas.openxmlformats.org/officeDocument/2006/relationships" xmlns:p="http://schemas.openxmlformats.org/presentationml/2006/main">
   <p:cSld>
     <p:bg>
@@ -19986,7 +20425,7 @@
 </p:sld>
 </file>
 
-<file path=ppt/slides/slide9.xml><?xml version="1.0" encoding="utf-8"?>
+<file path=ppt/slides/slide8.xml><?xml version="1.0" encoding="utf-8"?>
 <p:sld xmlns:a="http://schemas.openxmlformats.org/drawingml/2006/main" xmlns:r="http://schemas.openxmlformats.org/officeDocument/2006/relationships" xmlns:p="http://schemas.openxmlformats.org/presentationml/2006/main">
   <p:cSld>
     <p:bg>
@@ -20325,6 +20764,199 @@
 </p:sld>
 </file>
 
+<file path=ppt/slides/slide9.xml><?xml version="1.0" encoding="utf-8"?>
+<p:sld xmlns:a="http://schemas.openxmlformats.org/drawingml/2006/main" xmlns:r="http://schemas.openxmlformats.org/officeDocument/2006/relationships" xmlns:p="http://schemas.openxmlformats.org/presentationml/2006/main">
+  <p:cSld>
+    <p:bg>
+      <p:bgPr>
+        <a:solidFill>
+          <a:schemeClr val="bg1"/>
+        </a:solidFill>
+        <a:effectLst/>
+      </p:bgPr>
+    </p:bg>
+    <p:spTree>
+      <p:nvGrpSpPr>
+        <p:cNvPr id="1" name=""/>
+        <p:cNvGrpSpPr/>
+        <p:nvPr/>
+      </p:nvGrpSpPr>
+      <p:grpSpPr>
+        <a:xfrm>
+          <a:off x="0" y="0"/>
+          <a:ext cx="0" cy="0"/>
+          <a:chOff x="0" y="0"/>
+          <a:chExt cx="0" cy="0"/>
+        </a:xfrm>
+      </p:grpSpPr>
+      <p:sp>
+        <p:nvSpPr>
+          <p:cNvPr id="5" name="Title 4">
+            <a:extLst>
+              <a:ext uri="{FF2B5EF4-FFF2-40B4-BE49-F238E27FC236}">
+                <a16:creationId xmlns:a16="http://schemas.microsoft.com/office/drawing/2014/main" id="{E1067C6F-3E1F-4FDC-9F54-7957D73A797B}"/>
+              </a:ext>
+            </a:extLst>
+          </p:cNvPr>
+          <p:cNvSpPr>
+            <a:spLocks noGrp="1"/>
+          </p:cNvSpPr>
+          <p:nvPr>
+            <p:ph type="title"/>
+          </p:nvPr>
+        </p:nvSpPr>
+        <p:spPr>
+          <a:xfrm>
+            <a:off x="542926" y="157161"/>
+            <a:ext cx="10810874" cy="932688"/>
+          </a:xfrm>
+        </p:spPr>
+        <p:txBody>
+          <a:bodyPr vert="horz" lIns="91440" tIns="45720" rIns="91440" bIns="45720" rtlCol="0" anchor="b">
+            <a:normAutofit/>
+          </a:bodyPr>
+          <a:lstStyle/>
+          <a:p>
+            <a:r>
+              <a:rPr lang="en-US" sz="5400" kern="1200" dirty="0">
+                <a:solidFill>
+                  <a:schemeClr val="bg1">
+                    <a:lumMod val="50000"/>
+                  </a:schemeClr>
+                </a:solidFill>
+                <a:latin typeface="+mj-lt"/>
+                <a:ea typeface="+mj-ea"/>
+                <a:cs typeface="+mj-cs"/>
+              </a:rPr>
+              <a:t>Code View: Adding OTel to WebAPI</a:t>
+            </a:r>
+          </a:p>
+        </p:txBody>
+      </p:sp>
+      <p:sp>
+        <p:nvSpPr>
+          <p:cNvPr id="13" name="Rectangle 12">
+            <a:extLst>
+              <a:ext uri="{FF2B5EF4-FFF2-40B4-BE49-F238E27FC236}">
+                <a16:creationId xmlns:a16="http://schemas.microsoft.com/office/drawing/2014/main" id="{0465601C-04B5-4AE0-8300-C95A72ECD27F}"/>
+              </a:ext>
+              <a:ext uri="{C183D7F6-B498-43B3-948B-1728B52AA6E4}">
+                <adec:decorative xmlns:adec="http://schemas.microsoft.com/office/drawing/2017/decorative" val="1"/>
+              </a:ext>
+            </a:extLst>
+          </p:cNvPr>
+          <p:cNvSpPr>
+            <a:spLocks noGrp="1" noRot="1" noChangeAspect="1" noMove="1" noResize="1" noEditPoints="1" noAdjustHandles="1" noChangeArrowheads="1" noChangeShapeType="1" noTextEdit="1"/>
+          </p:cNvSpPr>
+          <p:nvPr>
+            <p:extLst>
+              <p:ext uri="{386F3935-93C4-4BCD-93E2-E3B085C9AB24}">
+                <p16:designElem xmlns:p16="http://schemas.microsoft.com/office/powerpoint/2015/main" val="1"/>
+              </p:ext>
+            </p:extLst>
+          </p:nvPr>
+        </p:nvSpPr>
+        <p:spPr>
+          <a:xfrm>
+            <a:off x="0" y="0"/>
+            <a:ext cx="126124" cy="6858000"/>
+          </a:xfrm>
+          <a:prstGeom prst="rect">
+            <a:avLst/>
+          </a:prstGeom>
+          <a:solidFill>
+            <a:srgbClr val="4472C4"/>
+          </a:solidFill>
+          <a:ln w="12700" cap="flat" cmpd="sng" algn="ctr">
+            <a:noFill/>
+            <a:prstDash val="solid"/>
+            <a:miter lim="800000"/>
+          </a:ln>
+          <a:effectLst/>
+        </p:spPr>
+        <p:txBody>
+          <a:bodyPr rtlCol="0" anchor="ctr"/>
+          <a:lstStyle/>
+          <a:p>
+            <a:pPr marL="0" marR="0" lvl="0" indent="0" algn="ctr" defTabSz="914400" eaLnBrk="1" fontAlgn="auto" latinLnBrk="0" hangingPunct="1">
+              <a:lnSpc>
+                <a:spcPct val="100000"/>
+              </a:lnSpc>
+              <a:spcBef>
+                <a:spcPts val="0"/>
+              </a:spcBef>
+              <a:spcAft>
+                <a:spcPts val="0"/>
+              </a:spcAft>
+              <a:buClrTx/>
+              <a:buSzTx/>
+              <a:buFontTx/>
+              <a:buNone/>
+              <a:tabLst/>
+              <a:defRPr/>
+            </a:pPr>
+            <a:endParaRPr kumimoji="0" lang="en-US" sz="1800" b="0" i="0" u="none" strike="noStrike" kern="0" cap="none" spc="0" normalizeH="0" baseline="0" noProof="0">
+              <a:ln>
+                <a:noFill/>
+              </a:ln>
+              <a:solidFill>
+                <a:prstClr val="white"/>
+              </a:solidFill>
+              <a:effectLst/>
+              <a:uLnTx/>
+              <a:uFillTx/>
+              <a:latin typeface="Calibri" panose="020F0502020204030204"/>
+              <a:ea typeface="+mn-ea"/>
+              <a:cs typeface="+mn-cs"/>
+            </a:endParaRPr>
+          </a:p>
+        </p:txBody>
+      </p:sp>
+      <p:pic>
+        <p:nvPicPr>
+          <p:cNvPr id="8" name="Content Placeholder 7">
+            <a:extLst>
+              <a:ext uri="{FF2B5EF4-FFF2-40B4-BE49-F238E27FC236}">
+                <a16:creationId xmlns:a16="http://schemas.microsoft.com/office/drawing/2014/main" id="{C250AFC3-B80B-4C29-B46F-BE013433A6D3}"/>
+              </a:ext>
+            </a:extLst>
+          </p:cNvPr>
+          <p:cNvPicPr>
+            <a:picLocks noGrp="1" noChangeAspect="1"/>
+          </p:cNvPicPr>
+          <p:nvPr>
+            <p:ph idx="1"/>
+          </p:nvPr>
+        </p:nvPicPr>
+        <p:blipFill>
+          <a:blip r:embed="rId2"/>
+          <a:stretch>
+            <a:fillRect/>
+          </a:stretch>
+        </p:blipFill>
+        <p:spPr>
+          <a:xfrm>
+            <a:off x="642938" y="1309504"/>
+            <a:ext cx="10975263" cy="5448484"/>
+          </a:xfrm>
+          <a:prstGeom prst="rect">
+            <a:avLst/>
+          </a:prstGeom>
+        </p:spPr>
+      </p:pic>
+    </p:spTree>
+    <p:extLst>
+      <p:ext uri="{BB962C8B-B14F-4D97-AF65-F5344CB8AC3E}">
+        <p14:creationId xmlns:p14="http://schemas.microsoft.com/office/powerpoint/2010/main" val="930279063"/>
+      </p:ext>
+    </p:extLst>
+  </p:cSld>
+  <p:clrMapOvr>
+    <a:masterClrMapping/>
+  </p:clrMapOvr>
+</p:sld>
+</file>
+
 <file path=ppt/theme/theme1.xml><?xml version="1.0" encoding="utf-8"?>
 <a:theme xmlns:a="http://schemas.openxmlformats.org/drawingml/2006/main" name="office theme">
   <a:themeElements>

</xml_diff>